<commit_message>
A feladat folytatása, további információk gyüjtése
</commit_message>
<xml_diff>
--- a/A GitHub.pptx
+++ b/A GitHub.pptx
@@ -8,6 +8,11 @@
     <p:sldId id="256" r:id="rId2"/>
     <p:sldId id="258" r:id="rId3"/>
     <p:sldId id="257" r:id="rId4"/>
+    <p:sldId id="259" r:id="rId5"/>
+    <p:sldId id="260" r:id="rId6"/>
+    <p:sldId id="261" r:id="rId7"/>
+    <p:sldId id="262" r:id="rId8"/>
+    <p:sldId id="263" r:id="rId9"/>
   </p:sldIdLst>
   <p:sldSz cx="12192000" cy="6858000"/>
   <p:notesSz cx="6858000" cy="9144000"/>
@@ -106,6 +111,11 @@
       </a:defRPr>
     </a:lvl9pPr>
   </p:defaultTextStyle>
+  <p:extLst>
+    <p:ext uri="{EFAFB233-063F-42B5-8137-9DF3F51BA10A}">
+      <p15:sldGuideLst xmlns:p15="http://schemas.microsoft.com/office/powerpoint/2012/main"/>
+    </p:ext>
+  </p:extLst>
 </p:presentation>
 </file>
 
@@ -240,7 +250,7 @@
           <a:p>
             <a:fld id="{2CB50A5F-5272-451B-89D3-66DFC9125D9E}" type="datetimeFigureOut">
               <a:rPr lang="hu-HU" smtClean="0"/>
-              <a:t>2022.09.20.</a:t>
+              <a:t>2022.09.21.</a:t>
             </a:fld>
             <a:endParaRPr lang="hu-HU"/>
           </a:p>
@@ -410,7 +420,7 @@
           <a:p>
             <a:fld id="{2CB50A5F-5272-451B-89D3-66DFC9125D9E}" type="datetimeFigureOut">
               <a:rPr lang="hu-HU" smtClean="0"/>
-              <a:t>2022.09.20.</a:t>
+              <a:t>2022.09.21.</a:t>
             </a:fld>
             <a:endParaRPr lang="hu-HU"/>
           </a:p>
@@ -590,7 +600,7 @@
           <a:p>
             <a:fld id="{2CB50A5F-5272-451B-89D3-66DFC9125D9E}" type="datetimeFigureOut">
               <a:rPr lang="hu-HU" smtClean="0"/>
-              <a:t>2022.09.20.</a:t>
+              <a:t>2022.09.21.</a:t>
             </a:fld>
             <a:endParaRPr lang="hu-HU"/>
           </a:p>
@@ -760,7 +770,7 @@
           <a:p>
             <a:fld id="{2CB50A5F-5272-451B-89D3-66DFC9125D9E}" type="datetimeFigureOut">
               <a:rPr lang="hu-HU" smtClean="0"/>
-              <a:t>2022.09.20.</a:t>
+              <a:t>2022.09.21.</a:t>
             </a:fld>
             <a:endParaRPr lang="hu-HU"/>
           </a:p>
@@ -1006,7 +1016,7 @@
           <a:p>
             <a:fld id="{2CB50A5F-5272-451B-89D3-66DFC9125D9E}" type="datetimeFigureOut">
               <a:rPr lang="hu-HU" smtClean="0"/>
-              <a:t>2022.09.20.</a:t>
+              <a:t>2022.09.21.</a:t>
             </a:fld>
             <a:endParaRPr lang="hu-HU"/>
           </a:p>
@@ -1238,7 +1248,7 @@
           <a:p>
             <a:fld id="{2CB50A5F-5272-451B-89D3-66DFC9125D9E}" type="datetimeFigureOut">
               <a:rPr lang="hu-HU" smtClean="0"/>
-              <a:t>2022.09.20.</a:t>
+              <a:t>2022.09.21.</a:t>
             </a:fld>
             <a:endParaRPr lang="hu-HU"/>
           </a:p>
@@ -1605,7 +1615,7 @@
           <a:p>
             <a:fld id="{2CB50A5F-5272-451B-89D3-66DFC9125D9E}" type="datetimeFigureOut">
               <a:rPr lang="hu-HU" smtClean="0"/>
-              <a:t>2022.09.20.</a:t>
+              <a:t>2022.09.21.</a:t>
             </a:fld>
             <a:endParaRPr lang="hu-HU"/>
           </a:p>
@@ -1723,7 +1733,7 @@
           <a:p>
             <a:fld id="{2CB50A5F-5272-451B-89D3-66DFC9125D9E}" type="datetimeFigureOut">
               <a:rPr lang="hu-HU" smtClean="0"/>
-              <a:t>2022.09.20.</a:t>
+              <a:t>2022.09.21.</a:t>
             </a:fld>
             <a:endParaRPr lang="hu-HU"/>
           </a:p>
@@ -1818,7 +1828,7 @@
           <a:p>
             <a:fld id="{2CB50A5F-5272-451B-89D3-66DFC9125D9E}" type="datetimeFigureOut">
               <a:rPr lang="hu-HU" smtClean="0"/>
-              <a:t>2022.09.20.</a:t>
+              <a:t>2022.09.21.</a:t>
             </a:fld>
             <a:endParaRPr lang="hu-HU"/>
           </a:p>
@@ -2095,7 +2105,7 @@
           <a:p>
             <a:fld id="{2CB50A5F-5272-451B-89D3-66DFC9125D9E}" type="datetimeFigureOut">
               <a:rPr lang="hu-HU" smtClean="0"/>
-              <a:t>2022.09.20.</a:t>
+              <a:t>2022.09.21.</a:t>
             </a:fld>
             <a:endParaRPr lang="hu-HU"/>
           </a:p>
@@ -2352,7 +2362,7 @@
           <a:p>
             <a:fld id="{2CB50A5F-5272-451B-89D3-66DFC9125D9E}" type="datetimeFigureOut">
               <a:rPr lang="hu-HU" smtClean="0"/>
-              <a:t>2022.09.20.</a:t>
+              <a:t>2022.09.21.</a:t>
             </a:fld>
             <a:endParaRPr lang="hu-HU"/>
           </a:p>
@@ -2565,7 +2575,7 @@
           <a:p>
             <a:fld id="{2CB50A5F-5272-451B-89D3-66DFC9125D9E}" type="datetimeFigureOut">
               <a:rPr lang="hu-HU" smtClean="0"/>
-              <a:t>2022.09.20.</a:t>
+              <a:t>2022.09.21.</a:t>
             </a:fld>
             <a:endParaRPr lang="hu-HU"/>
           </a:p>
@@ -3117,6 +3127,25 @@
   <p:clrMapOvr>
     <a:masterClrMapping/>
   </p:clrMapOvr>
+  <mc:AlternateContent xmlns:mc="http://schemas.openxmlformats.org/markup-compatibility/2006">
+    <mc:Choice xmlns:p14="http://schemas.microsoft.com/office/powerpoint/2010/main" Requires="p14">
+      <p:transition spd="med" p14:dur="700">
+        <p:fade/>
+      </p:transition>
+    </mc:Choice>
+    <mc:Fallback>
+      <p:transition spd="med">
+        <p:fade/>
+      </p:transition>
+    </mc:Fallback>
+  </mc:AlternateContent>
+  <p:timing>
+    <p:tnLst>
+      <p:par>
+        <p:cTn id="1" dur="indefinite" restart="never" nodeType="tmRoot"/>
+      </p:par>
+    </p:tnLst>
+  </p:timing>
 </p:sld>
 </file>
 
@@ -3279,6 +3308,337 @@
   <p:clrMapOvr>
     <a:masterClrMapping/>
   </p:clrMapOvr>
+  <mc:AlternateContent xmlns:mc="http://schemas.openxmlformats.org/markup-compatibility/2006">
+    <mc:Choice xmlns:p14="http://schemas.microsoft.com/office/powerpoint/2010/main" Requires="p14">
+      <p:transition spd="med" p14:dur="700">
+        <p:fade/>
+      </p:transition>
+    </mc:Choice>
+    <mc:Fallback>
+      <p:transition spd="med">
+        <p:fade/>
+      </p:transition>
+    </mc:Fallback>
+  </mc:AlternateContent>
+  <p:timing>
+    <p:tnLst>
+      <p:par>
+        <p:cTn id="1" dur="indefinite" restart="never" nodeType="tmRoot">
+          <p:childTnLst>
+            <p:seq concurrent="1" nextAc="seek">
+              <p:cTn id="2" dur="indefinite" nodeType="mainSeq">
+                <p:childTnLst>
+                  <p:par>
+                    <p:cTn id="3" fill="hold">
+                      <p:stCondLst>
+                        <p:cond delay="indefinite"/>
+                      </p:stCondLst>
+                      <p:childTnLst>
+                        <p:par>
+                          <p:cTn id="4" fill="hold">
+                            <p:stCondLst>
+                              <p:cond delay="0"/>
+                            </p:stCondLst>
+                            <p:childTnLst>
+                              <p:par>
+                                <p:cTn id="5" presetID="10" presetClass="entr" presetSubtype="0" fill="hold" grpId="0" nodeType="clickEffect">
+                                  <p:stCondLst>
+                                    <p:cond delay="0"/>
+                                  </p:stCondLst>
+                                  <p:childTnLst>
+                                    <p:set>
+                                      <p:cBhvr>
+                                        <p:cTn id="6" dur="1" fill="hold">
+                                          <p:stCondLst>
+                                            <p:cond delay="0"/>
+                                          </p:stCondLst>
+                                        </p:cTn>
+                                        <p:tgtEl>
+                                          <p:spTgt spid="2"/>
+                                        </p:tgtEl>
+                                        <p:attrNameLst>
+                                          <p:attrName>style.visibility</p:attrName>
+                                        </p:attrNameLst>
+                                      </p:cBhvr>
+                                      <p:to>
+                                        <p:strVal val="visible"/>
+                                      </p:to>
+                                    </p:set>
+                                    <p:animEffect transition="in" filter="fade">
+                                      <p:cBhvr>
+                                        <p:cTn id="7" dur="500"/>
+                                        <p:tgtEl>
+                                          <p:spTgt spid="2"/>
+                                        </p:tgtEl>
+                                      </p:cBhvr>
+                                    </p:animEffect>
+                                  </p:childTnLst>
+                                </p:cTn>
+                              </p:par>
+                            </p:childTnLst>
+                          </p:cTn>
+                        </p:par>
+                      </p:childTnLst>
+                    </p:cTn>
+                  </p:par>
+                  <p:par>
+                    <p:cTn id="8" fill="hold">
+                      <p:stCondLst>
+                        <p:cond delay="indefinite"/>
+                      </p:stCondLst>
+                      <p:childTnLst>
+                        <p:par>
+                          <p:cTn id="9" fill="hold">
+                            <p:stCondLst>
+                              <p:cond delay="0"/>
+                            </p:stCondLst>
+                            <p:childTnLst>
+                              <p:par>
+                                <p:cTn id="10" presetID="10" presetClass="entr" presetSubtype="0" fill="hold" nodeType="clickEffect">
+                                  <p:stCondLst>
+                                    <p:cond delay="0"/>
+                                  </p:stCondLst>
+                                  <p:childTnLst>
+                                    <p:set>
+                                      <p:cBhvr>
+                                        <p:cTn id="11" dur="1" fill="hold">
+                                          <p:stCondLst>
+                                            <p:cond delay="0"/>
+                                          </p:stCondLst>
+                                        </p:cTn>
+                                        <p:tgtEl>
+                                          <p:spTgt spid="3">
+                                            <p:txEl>
+                                              <p:pRg st="0" end="0"/>
+                                            </p:txEl>
+                                          </p:spTgt>
+                                        </p:tgtEl>
+                                        <p:attrNameLst>
+                                          <p:attrName>style.visibility</p:attrName>
+                                        </p:attrNameLst>
+                                      </p:cBhvr>
+                                      <p:to>
+                                        <p:strVal val="visible"/>
+                                      </p:to>
+                                    </p:set>
+                                    <p:animEffect transition="in" filter="fade">
+                                      <p:cBhvr>
+                                        <p:cTn id="12" dur="500"/>
+                                        <p:tgtEl>
+                                          <p:spTgt spid="3">
+                                            <p:txEl>
+                                              <p:pRg st="0" end="0"/>
+                                            </p:txEl>
+                                          </p:spTgt>
+                                        </p:tgtEl>
+                                      </p:cBhvr>
+                                    </p:animEffect>
+                                  </p:childTnLst>
+                                </p:cTn>
+                              </p:par>
+                              <p:par>
+                                <p:cTn id="13" presetID="10" presetClass="entr" presetSubtype="0" fill="hold" nodeType="withEffect">
+                                  <p:stCondLst>
+                                    <p:cond delay="0"/>
+                                  </p:stCondLst>
+                                  <p:childTnLst>
+                                    <p:set>
+                                      <p:cBhvr>
+                                        <p:cTn id="14" dur="1" fill="hold">
+                                          <p:stCondLst>
+                                            <p:cond delay="0"/>
+                                          </p:stCondLst>
+                                        </p:cTn>
+                                        <p:tgtEl>
+                                          <p:spTgt spid="3">
+                                            <p:txEl>
+                                              <p:pRg st="1" end="1"/>
+                                            </p:txEl>
+                                          </p:spTgt>
+                                        </p:tgtEl>
+                                        <p:attrNameLst>
+                                          <p:attrName>style.visibility</p:attrName>
+                                        </p:attrNameLst>
+                                      </p:cBhvr>
+                                      <p:to>
+                                        <p:strVal val="visible"/>
+                                      </p:to>
+                                    </p:set>
+                                    <p:animEffect transition="in" filter="fade">
+                                      <p:cBhvr>
+                                        <p:cTn id="15" dur="500"/>
+                                        <p:tgtEl>
+                                          <p:spTgt spid="3">
+                                            <p:txEl>
+                                              <p:pRg st="1" end="1"/>
+                                            </p:txEl>
+                                          </p:spTgt>
+                                        </p:tgtEl>
+                                      </p:cBhvr>
+                                    </p:animEffect>
+                                  </p:childTnLst>
+                                </p:cTn>
+                              </p:par>
+                              <p:par>
+                                <p:cTn id="16" presetID="10" presetClass="entr" presetSubtype="0" fill="hold" nodeType="withEffect">
+                                  <p:stCondLst>
+                                    <p:cond delay="0"/>
+                                  </p:stCondLst>
+                                  <p:childTnLst>
+                                    <p:set>
+                                      <p:cBhvr>
+                                        <p:cTn id="17" dur="1" fill="hold">
+                                          <p:stCondLst>
+                                            <p:cond delay="0"/>
+                                          </p:stCondLst>
+                                        </p:cTn>
+                                        <p:tgtEl>
+                                          <p:spTgt spid="3">
+                                            <p:txEl>
+                                              <p:pRg st="2" end="2"/>
+                                            </p:txEl>
+                                          </p:spTgt>
+                                        </p:tgtEl>
+                                        <p:attrNameLst>
+                                          <p:attrName>style.visibility</p:attrName>
+                                        </p:attrNameLst>
+                                      </p:cBhvr>
+                                      <p:to>
+                                        <p:strVal val="visible"/>
+                                      </p:to>
+                                    </p:set>
+                                    <p:animEffect transition="in" filter="fade">
+                                      <p:cBhvr>
+                                        <p:cTn id="18" dur="500"/>
+                                        <p:tgtEl>
+                                          <p:spTgt spid="3">
+                                            <p:txEl>
+                                              <p:pRg st="2" end="2"/>
+                                            </p:txEl>
+                                          </p:spTgt>
+                                        </p:tgtEl>
+                                      </p:cBhvr>
+                                    </p:animEffect>
+                                  </p:childTnLst>
+                                </p:cTn>
+                              </p:par>
+                              <p:par>
+                                <p:cTn id="19" presetID="10" presetClass="entr" presetSubtype="0" fill="hold" nodeType="withEffect">
+                                  <p:stCondLst>
+                                    <p:cond delay="0"/>
+                                  </p:stCondLst>
+                                  <p:childTnLst>
+                                    <p:set>
+                                      <p:cBhvr>
+                                        <p:cTn id="20" dur="1" fill="hold">
+                                          <p:stCondLst>
+                                            <p:cond delay="0"/>
+                                          </p:stCondLst>
+                                        </p:cTn>
+                                        <p:tgtEl>
+                                          <p:spTgt spid="3">
+                                            <p:txEl>
+                                              <p:pRg st="3" end="3"/>
+                                            </p:txEl>
+                                          </p:spTgt>
+                                        </p:tgtEl>
+                                        <p:attrNameLst>
+                                          <p:attrName>style.visibility</p:attrName>
+                                        </p:attrNameLst>
+                                      </p:cBhvr>
+                                      <p:to>
+                                        <p:strVal val="visible"/>
+                                      </p:to>
+                                    </p:set>
+                                    <p:animEffect transition="in" filter="fade">
+                                      <p:cBhvr>
+                                        <p:cTn id="21" dur="500"/>
+                                        <p:tgtEl>
+                                          <p:spTgt spid="3">
+                                            <p:txEl>
+                                              <p:pRg st="3" end="3"/>
+                                            </p:txEl>
+                                          </p:spTgt>
+                                        </p:tgtEl>
+                                      </p:cBhvr>
+                                    </p:animEffect>
+                                  </p:childTnLst>
+                                </p:cTn>
+                              </p:par>
+                              <p:par>
+                                <p:cTn id="22" presetID="10" presetClass="entr" presetSubtype="0" fill="hold" nodeType="withEffect">
+                                  <p:stCondLst>
+                                    <p:cond delay="0"/>
+                                  </p:stCondLst>
+                                  <p:childTnLst>
+                                    <p:set>
+                                      <p:cBhvr>
+                                        <p:cTn id="23" dur="1" fill="hold">
+                                          <p:stCondLst>
+                                            <p:cond delay="0"/>
+                                          </p:stCondLst>
+                                        </p:cTn>
+                                        <p:tgtEl>
+                                          <p:spTgt spid="3">
+                                            <p:txEl>
+                                              <p:pRg st="4" end="4"/>
+                                            </p:txEl>
+                                          </p:spTgt>
+                                        </p:tgtEl>
+                                        <p:attrNameLst>
+                                          <p:attrName>style.visibility</p:attrName>
+                                        </p:attrNameLst>
+                                      </p:cBhvr>
+                                      <p:to>
+                                        <p:strVal val="visible"/>
+                                      </p:to>
+                                    </p:set>
+                                    <p:animEffect transition="in" filter="fade">
+                                      <p:cBhvr>
+                                        <p:cTn id="24" dur="500"/>
+                                        <p:tgtEl>
+                                          <p:spTgt spid="3">
+                                            <p:txEl>
+                                              <p:pRg st="4" end="4"/>
+                                            </p:txEl>
+                                          </p:spTgt>
+                                        </p:tgtEl>
+                                      </p:cBhvr>
+                                    </p:animEffect>
+                                  </p:childTnLst>
+                                </p:cTn>
+                              </p:par>
+                            </p:childTnLst>
+                          </p:cTn>
+                        </p:par>
+                      </p:childTnLst>
+                    </p:cTn>
+                  </p:par>
+                </p:childTnLst>
+              </p:cTn>
+              <p:prevCondLst>
+                <p:cond evt="onPrev" delay="0">
+                  <p:tgtEl>
+                    <p:sldTgt/>
+                  </p:tgtEl>
+                </p:cond>
+              </p:prevCondLst>
+              <p:nextCondLst>
+                <p:cond evt="onNext" delay="0">
+                  <p:tgtEl>
+                    <p:sldTgt/>
+                  </p:tgtEl>
+                </p:cond>
+              </p:nextCondLst>
+            </p:seq>
+          </p:childTnLst>
+        </p:cTn>
+      </p:par>
+    </p:tnLst>
+    <p:bldLst>
+      <p:bldP spid="2" grpId="0"/>
+    </p:bldLst>
+  </p:timing>
 </p:sld>
 </file>
 
@@ -3345,7 +3705,7 @@
         </p:spPr>
         <p:txBody>
           <a:bodyPr>
-            <a:normAutofit/>
+            <a:normAutofit lnSpcReduction="10000"/>
           </a:bodyPr>
           <a:lstStyle/>
           <a:p>
@@ -3353,46 +3713,63 @@
               <a:buNone/>
             </a:pPr>
             <a:r>
-              <a:rPr lang="hu-HU" sz="3000" dirty="0" smtClean="0"/>
+              <a:rPr lang="hu-HU" sz="3000" dirty="0" smtClean="0">
+                <a:latin typeface="Bahnschrift SemiBold" panose="020B0502040204020203" pitchFamily="34" charset="0"/>
+              </a:rPr>
               <a:t>Lehetővé teszi: </a:t>
             </a:r>
           </a:p>
           <a:p>
             <a:pPr lvl="1"/>
             <a:r>
-              <a:rPr lang="hu-HU" sz="3000" dirty="0" smtClean="0"/>
+              <a:rPr lang="hu-HU" sz="3000" dirty="0" smtClean="0">
+                <a:latin typeface="Bahnschrift SemiBold" panose="020B0502040204020203" pitchFamily="34" charset="0"/>
+              </a:rPr>
               <a:t>Dokumentáció</a:t>
             </a:r>
           </a:p>
           <a:p>
             <a:pPr lvl="1"/>
             <a:r>
-              <a:rPr lang="hu-HU" sz="3000" dirty="0" smtClean="0"/>
+              <a:rPr lang="hu-HU" sz="3000" dirty="0" smtClean="0">
+                <a:latin typeface="Bahnschrift SemiBold" panose="020B0502040204020203" pitchFamily="34" charset="0"/>
+              </a:rPr>
               <a:t>Verzió/kiadáskövetés (címkékkel, mérföldkövekkel…)</a:t>
             </a:r>
           </a:p>
           <a:p>
             <a:pPr lvl="1"/>
             <a:r>
-              <a:rPr lang="hu-HU" sz="3000" dirty="0" smtClean="0"/>
-              <a:t>Feladatkeresés</a:t>
-            </a:r>
+              <a:rPr lang="hu-HU" sz="3000" dirty="0" smtClean="0">
+                <a:latin typeface="Bahnschrift SemiBold" panose="020B0502040204020203" pitchFamily="34" charset="0"/>
+              </a:rPr>
+              <a:t>Feladatkezelés</a:t>
+            </a:r>
+            <a:endParaRPr lang="hu-HU" sz="3000" dirty="0" smtClean="0">
+              <a:latin typeface="Bahnschrift SemiBold" panose="020B0502040204020203" pitchFamily="34" charset="0"/>
+            </a:endParaRPr>
           </a:p>
           <a:p>
             <a:pPr lvl="1"/>
             <a:r>
-              <a:rPr lang="hu-HU" sz="3000" dirty="0" smtClean="0"/>
+              <a:rPr lang="hu-HU" sz="3000" dirty="0" smtClean="0">
+                <a:latin typeface="Bahnschrift SemiBold" panose="020B0502040204020203" pitchFamily="34" charset="0"/>
+              </a:rPr>
               <a:t>Csapatmunka közös projekteken (online)</a:t>
             </a:r>
           </a:p>
           <a:p>
             <a:pPr lvl="1"/>
             <a:r>
-              <a:rPr lang="hu-HU" sz="3000" dirty="0" smtClean="0"/>
+              <a:rPr lang="hu-HU" sz="3000" dirty="0" smtClean="0">
+                <a:latin typeface="Bahnschrift SemiBold" panose="020B0502040204020203" pitchFamily="34" charset="0"/>
+              </a:rPr>
               <a:t>Bugkövetés (felmerülő hibák észlelése &amp; javítása</a:t>
             </a:r>
             <a:r>
-              <a:rPr lang="hu-HU" sz="3000" dirty="0"/>
+              <a:rPr lang="hu-HU" sz="3000" dirty="0">
+                <a:latin typeface="Bahnschrift SemiBold" panose="020B0502040204020203" pitchFamily="34" charset="0"/>
+              </a:rPr>
               <a:t>)</a:t>
             </a:r>
           </a:p>
@@ -3419,7 +3796,7 @@
         </p:blipFill>
         <p:spPr>
           <a:xfrm>
-            <a:off x="6874136" y="1825625"/>
+            <a:off x="6874136" y="2345485"/>
             <a:ext cx="3640949" cy="3311618"/>
           </a:xfrm>
           <a:prstGeom prst="rect">
@@ -3437,6 +3814,1503 @@
   <p:clrMapOvr>
     <a:masterClrMapping/>
   </p:clrMapOvr>
+  <p:timing>
+    <p:tnLst>
+      <p:par>
+        <p:cTn id="1" dur="indefinite" restart="never" nodeType="tmRoot">
+          <p:childTnLst>
+            <p:seq concurrent="1" nextAc="seek">
+              <p:cTn id="2" dur="indefinite" nodeType="mainSeq">
+                <p:childTnLst>
+                  <p:par>
+                    <p:cTn id="3" fill="hold">
+                      <p:stCondLst>
+                        <p:cond delay="indefinite"/>
+                      </p:stCondLst>
+                      <p:childTnLst>
+                        <p:par>
+                          <p:cTn id="4" fill="hold">
+                            <p:stCondLst>
+                              <p:cond delay="0"/>
+                            </p:stCondLst>
+                            <p:childTnLst>
+                              <p:par>
+                                <p:cTn id="5" presetID="10" presetClass="entr" presetSubtype="0" fill="hold" grpId="0" nodeType="clickEffect">
+                                  <p:stCondLst>
+                                    <p:cond delay="0"/>
+                                  </p:stCondLst>
+                                  <p:childTnLst>
+                                    <p:set>
+                                      <p:cBhvr>
+                                        <p:cTn id="6" dur="1" fill="hold">
+                                          <p:stCondLst>
+                                            <p:cond delay="0"/>
+                                          </p:stCondLst>
+                                        </p:cTn>
+                                        <p:tgtEl>
+                                          <p:spTgt spid="2"/>
+                                        </p:tgtEl>
+                                        <p:attrNameLst>
+                                          <p:attrName>style.visibility</p:attrName>
+                                        </p:attrNameLst>
+                                      </p:cBhvr>
+                                      <p:to>
+                                        <p:strVal val="visible"/>
+                                      </p:to>
+                                    </p:set>
+                                    <p:animEffect transition="in" filter="fade">
+                                      <p:cBhvr>
+                                        <p:cTn id="7" dur="500"/>
+                                        <p:tgtEl>
+                                          <p:spTgt spid="2"/>
+                                        </p:tgtEl>
+                                      </p:cBhvr>
+                                    </p:animEffect>
+                                  </p:childTnLst>
+                                </p:cTn>
+                              </p:par>
+                            </p:childTnLst>
+                          </p:cTn>
+                        </p:par>
+                      </p:childTnLst>
+                    </p:cTn>
+                  </p:par>
+                  <p:par>
+                    <p:cTn id="8" fill="hold">
+                      <p:stCondLst>
+                        <p:cond delay="indefinite"/>
+                      </p:stCondLst>
+                      <p:childTnLst>
+                        <p:par>
+                          <p:cTn id="9" fill="hold">
+                            <p:stCondLst>
+                              <p:cond delay="0"/>
+                            </p:stCondLst>
+                            <p:childTnLst>
+                              <p:par>
+                                <p:cTn id="10" presetID="10" presetClass="entr" presetSubtype="0" fill="hold" nodeType="clickEffect">
+                                  <p:stCondLst>
+                                    <p:cond delay="0"/>
+                                  </p:stCondLst>
+                                  <p:childTnLst>
+                                    <p:set>
+                                      <p:cBhvr>
+                                        <p:cTn id="11" dur="1" fill="hold">
+                                          <p:stCondLst>
+                                            <p:cond delay="0"/>
+                                          </p:stCondLst>
+                                        </p:cTn>
+                                        <p:tgtEl>
+                                          <p:spTgt spid="3">
+                                            <p:txEl>
+                                              <p:pRg st="0" end="0"/>
+                                            </p:txEl>
+                                          </p:spTgt>
+                                        </p:tgtEl>
+                                        <p:attrNameLst>
+                                          <p:attrName>style.visibility</p:attrName>
+                                        </p:attrNameLst>
+                                      </p:cBhvr>
+                                      <p:to>
+                                        <p:strVal val="visible"/>
+                                      </p:to>
+                                    </p:set>
+                                    <p:animEffect transition="in" filter="fade">
+                                      <p:cBhvr>
+                                        <p:cTn id="12" dur="500"/>
+                                        <p:tgtEl>
+                                          <p:spTgt spid="3">
+                                            <p:txEl>
+                                              <p:pRg st="0" end="0"/>
+                                            </p:txEl>
+                                          </p:spTgt>
+                                        </p:tgtEl>
+                                      </p:cBhvr>
+                                    </p:animEffect>
+                                  </p:childTnLst>
+                                </p:cTn>
+                              </p:par>
+                              <p:par>
+                                <p:cTn id="13" presetID="10" presetClass="entr" presetSubtype="0" fill="hold" nodeType="withEffect">
+                                  <p:stCondLst>
+                                    <p:cond delay="0"/>
+                                  </p:stCondLst>
+                                  <p:childTnLst>
+                                    <p:set>
+                                      <p:cBhvr>
+                                        <p:cTn id="14" dur="1" fill="hold">
+                                          <p:stCondLst>
+                                            <p:cond delay="0"/>
+                                          </p:stCondLst>
+                                        </p:cTn>
+                                        <p:tgtEl>
+                                          <p:spTgt spid="3">
+                                            <p:txEl>
+                                              <p:pRg st="1" end="1"/>
+                                            </p:txEl>
+                                          </p:spTgt>
+                                        </p:tgtEl>
+                                        <p:attrNameLst>
+                                          <p:attrName>style.visibility</p:attrName>
+                                        </p:attrNameLst>
+                                      </p:cBhvr>
+                                      <p:to>
+                                        <p:strVal val="visible"/>
+                                      </p:to>
+                                    </p:set>
+                                    <p:animEffect transition="in" filter="fade">
+                                      <p:cBhvr>
+                                        <p:cTn id="15" dur="500"/>
+                                        <p:tgtEl>
+                                          <p:spTgt spid="3">
+                                            <p:txEl>
+                                              <p:pRg st="1" end="1"/>
+                                            </p:txEl>
+                                          </p:spTgt>
+                                        </p:tgtEl>
+                                      </p:cBhvr>
+                                    </p:animEffect>
+                                  </p:childTnLst>
+                                </p:cTn>
+                              </p:par>
+                              <p:par>
+                                <p:cTn id="16" presetID="10" presetClass="entr" presetSubtype="0" fill="hold" nodeType="withEffect">
+                                  <p:stCondLst>
+                                    <p:cond delay="0"/>
+                                  </p:stCondLst>
+                                  <p:childTnLst>
+                                    <p:set>
+                                      <p:cBhvr>
+                                        <p:cTn id="17" dur="1" fill="hold">
+                                          <p:stCondLst>
+                                            <p:cond delay="0"/>
+                                          </p:stCondLst>
+                                        </p:cTn>
+                                        <p:tgtEl>
+                                          <p:spTgt spid="3">
+                                            <p:txEl>
+                                              <p:pRg st="2" end="2"/>
+                                            </p:txEl>
+                                          </p:spTgt>
+                                        </p:tgtEl>
+                                        <p:attrNameLst>
+                                          <p:attrName>style.visibility</p:attrName>
+                                        </p:attrNameLst>
+                                      </p:cBhvr>
+                                      <p:to>
+                                        <p:strVal val="visible"/>
+                                      </p:to>
+                                    </p:set>
+                                    <p:animEffect transition="in" filter="fade">
+                                      <p:cBhvr>
+                                        <p:cTn id="18" dur="500"/>
+                                        <p:tgtEl>
+                                          <p:spTgt spid="3">
+                                            <p:txEl>
+                                              <p:pRg st="2" end="2"/>
+                                            </p:txEl>
+                                          </p:spTgt>
+                                        </p:tgtEl>
+                                      </p:cBhvr>
+                                    </p:animEffect>
+                                  </p:childTnLst>
+                                </p:cTn>
+                              </p:par>
+                              <p:par>
+                                <p:cTn id="19" presetID="10" presetClass="entr" presetSubtype="0" fill="hold" nodeType="withEffect">
+                                  <p:stCondLst>
+                                    <p:cond delay="0"/>
+                                  </p:stCondLst>
+                                  <p:childTnLst>
+                                    <p:set>
+                                      <p:cBhvr>
+                                        <p:cTn id="20" dur="1" fill="hold">
+                                          <p:stCondLst>
+                                            <p:cond delay="0"/>
+                                          </p:stCondLst>
+                                        </p:cTn>
+                                        <p:tgtEl>
+                                          <p:spTgt spid="3">
+                                            <p:txEl>
+                                              <p:pRg st="3" end="3"/>
+                                            </p:txEl>
+                                          </p:spTgt>
+                                        </p:tgtEl>
+                                        <p:attrNameLst>
+                                          <p:attrName>style.visibility</p:attrName>
+                                        </p:attrNameLst>
+                                      </p:cBhvr>
+                                      <p:to>
+                                        <p:strVal val="visible"/>
+                                      </p:to>
+                                    </p:set>
+                                    <p:animEffect transition="in" filter="fade">
+                                      <p:cBhvr>
+                                        <p:cTn id="21" dur="500"/>
+                                        <p:tgtEl>
+                                          <p:spTgt spid="3">
+                                            <p:txEl>
+                                              <p:pRg st="3" end="3"/>
+                                            </p:txEl>
+                                          </p:spTgt>
+                                        </p:tgtEl>
+                                      </p:cBhvr>
+                                    </p:animEffect>
+                                  </p:childTnLst>
+                                </p:cTn>
+                              </p:par>
+                              <p:par>
+                                <p:cTn id="22" presetID="10" presetClass="entr" presetSubtype="0" fill="hold" nodeType="withEffect">
+                                  <p:stCondLst>
+                                    <p:cond delay="0"/>
+                                  </p:stCondLst>
+                                  <p:childTnLst>
+                                    <p:set>
+                                      <p:cBhvr>
+                                        <p:cTn id="23" dur="1" fill="hold">
+                                          <p:stCondLst>
+                                            <p:cond delay="0"/>
+                                          </p:stCondLst>
+                                        </p:cTn>
+                                        <p:tgtEl>
+                                          <p:spTgt spid="3">
+                                            <p:txEl>
+                                              <p:pRg st="4" end="4"/>
+                                            </p:txEl>
+                                          </p:spTgt>
+                                        </p:tgtEl>
+                                        <p:attrNameLst>
+                                          <p:attrName>style.visibility</p:attrName>
+                                        </p:attrNameLst>
+                                      </p:cBhvr>
+                                      <p:to>
+                                        <p:strVal val="visible"/>
+                                      </p:to>
+                                    </p:set>
+                                    <p:animEffect transition="in" filter="fade">
+                                      <p:cBhvr>
+                                        <p:cTn id="24" dur="500"/>
+                                        <p:tgtEl>
+                                          <p:spTgt spid="3">
+                                            <p:txEl>
+                                              <p:pRg st="4" end="4"/>
+                                            </p:txEl>
+                                          </p:spTgt>
+                                        </p:tgtEl>
+                                      </p:cBhvr>
+                                    </p:animEffect>
+                                  </p:childTnLst>
+                                </p:cTn>
+                              </p:par>
+                              <p:par>
+                                <p:cTn id="25" presetID="10" presetClass="entr" presetSubtype="0" fill="hold" nodeType="withEffect">
+                                  <p:stCondLst>
+                                    <p:cond delay="0"/>
+                                  </p:stCondLst>
+                                  <p:childTnLst>
+                                    <p:set>
+                                      <p:cBhvr>
+                                        <p:cTn id="26" dur="1" fill="hold">
+                                          <p:stCondLst>
+                                            <p:cond delay="0"/>
+                                          </p:stCondLst>
+                                        </p:cTn>
+                                        <p:tgtEl>
+                                          <p:spTgt spid="3">
+                                            <p:txEl>
+                                              <p:pRg st="5" end="5"/>
+                                            </p:txEl>
+                                          </p:spTgt>
+                                        </p:tgtEl>
+                                        <p:attrNameLst>
+                                          <p:attrName>style.visibility</p:attrName>
+                                        </p:attrNameLst>
+                                      </p:cBhvr>
+                                      <p:to>
+                                        <p:strVal val="visible"/>
+                                      </p:to>
+                                    </p:set>
+                                    <p:animEffect transition="in" filter="fade">
+                                      <p:cBhvr>
+                                        <p:cTn id="27" dur="500"/>
+                                        <p:tgtEl>
+                                          <p:spTgt spid="3">
+                                            <p:txEl>
+                                              <p:pRg st="5" end="5"/>
+                                            </p:txEl>
+                                          </p:spTgt>
+                                        </p:tgtEl>
+                                      </p:cBhvr>
+                                    </p:animEffect>
+                                  </p:childTnLst>
+                                </p:cTn>
+                              </p:par>
+                            </p:childTnLst>
+                          </p:cTn>
+                        </p:par>
+                      </p:childTnLst>
+                    </p:cTn>
+                  </p:par>
+                  <p:par>
+                    <p:cTn id="28" fill="hold">
+                      <p:stCondLst>
+                        <p:cond delay="indefinite"/>
+                      </p:stCondLst>
+                      <p:childTnLst>
+                        <p:par>
+                          <p:cTn id="29" fill="hold">
+                            <p:stCondLst>
+                              <p:cond delay="0"/>
+                            </p:stCondLst>
+                            <p:childTnLst>
+                              <p:par>
+                                <p:cTn id="30" presetID="10" presetClass="entr" presetSubtype="0" fill="hold" nodeType="clickEffect">
+                                  <p:stCondLst>
+                                    <p:cond delay="0"/>
+                                  </p:stCondLst>
+                                  <p:childTnLst>
+                                    <p:set>
+                                      <p:cBhvr>
+                                        <p:cTn id="31" dur="1" fill="hold">
+                                          <p:stCondLst>
+                                            <p:cond delay="0"/>
+                                          </p:stCondLst>
+                                        </p:cTn>
+                                        <p:tgtEl>
+                                          <p:spTgt spid="4"/>
+                                        </p:tgtEl>
+                                        <p:attrNameLst>
+                                          <p:attrName>style.visibility</p:attrName>
+                                        </p:attrNameLst>
+                                      </p:cBhvr>
+                                      <p:to>
+                                        <p:strVal val="visible"/>
+                                      </p:to>
+                                    </p:set>
+                                    <p:animEffect transition="in" filter="fade">
+                                      <p:cBhvr>
+                                        <p:cTn id="32" dur="500"/>
+                                        <p:tgtEl>
+                                          <p:spTgt spid="4"/>
+                                        </p:tgtEl>
+                                      </p:cBhvr>
+                                    </p:animEffect>
+                                  </p:childTnLst>
+                                </p:cTn>
+                              </p:par>
+                            </p:childTnLst>
+                          </p:cTn>
+                        </p:par>
+                      </p:childTnLst>
+                    </p:cTn>
+                  </p:par>
+                </p:childTnLst>
+              </p:cTn>
+              <p:prevCondLst>
+                <p:cond evt="onPrev" delay="0">
+                  <p:tgtEl>
+                    <p:sldTgt/>
+                  </p:tgtEl>
+                </p:cond>
+              </p:prevCondLst>
+              <p:nextCondLst>
+                <p:cond evt="onNext" delay="0">
+                  <p:tgtEl>
+                    <p:sldTgt/>
+                  </p:tgtEl>
+                </p:cond>
+              </p:nextCondLst>
+            </p:seq>
+          </p:childTnLst>
+        </p:cTn>
+      </p:par>
+    </p:tnLst>
+    <p:bldLst>
+      <p:bldP spid="2" grpId="0"/>
+    </p:bldLst>
+  </p:timing>
+</p:sld>
+</file>
+
+<file path=ppt/slides/slide4.xml><?xml version="1.0" encoding="utf-8"?>
+<p:sld xmlns:a="http://schemas.openxmlformats.org/drawingml/2006/main" xmlns:r="http://schemas.openxmlformats.org/officeDocument/2006/relationships" xmlns:p="http://schemas.openxmlformats.org/presentationml/2006/main">
+  <p:cSld>
+    <p:spTree>
+      <p:nvGrpSpPr>
+        <p:cNvPr id="1" name=""/>
+        <p:cNvGrpSpPr/>
+        <p:nvPr/>
+      </p:nvGrpSpPr>
+      <p:grpSpPr>
+        <a:xfrm>
+          <a:off x="0" y="0"/>
+          <a:ext cx="0" cy="0"/>
+          <a:chOff x="0" y="0"/>
+          <a:chExt cx="0" cy="0"/>
+        </a:xfrm>
+      </p:grpSpPr>
+      <p:sp>
+        <p:nvSpPr>
+          <p:cNvPr id="2" name="Cím 1"/>
+          <p:cNvSpPr>
+            <a:spLocks noGrp="1"/>
+          </p:cNvSpPr>
+          <p:nvPr>
+            <p:ph type="title"/>
+          </p:nvPr>
+        </p:nvSpPr>
+        <p:spPr/>
+        <p:txBody>
+          <a:bodyPr>
+            <a:normAutofit/>
+          </a:bodyPr>
+          <a:lstStyle/>
+          <a:p>
+            <a:pPr algn="ctr"/>
+            <a:r>
+              <a:rPr lang="hu-HU" sz="6000" dirty="0" smtClean="0">
+                <a:latin typeface="Bahnschrift SemiBold" panose="020B0502040204020203" pitchFamily="34" charset="0"/>
+              </a:rPr>
+              <a:t>A cég története</a:t>
+            </a:r>
+            <a:endParaRPr lang="hu-HU" sz="6000" dirty="0">
+              <a:latin typeface="Bahnschrift SemiBold" panose="020B0502040204020203" pitchFamily="34" charset="0"/>
+            </a:endParaRPr>
+          </a:p>
+        </p:txBody>
+      </p:sp>
+      <p:sp>
+        <p:nvSpPr>
+          <p:cNvPr id="3" name="Tartalom helye 2"/>
+          <p:cNvSpPr>
+            <a:spLocks noGrp="1"/>
+          </p:cNvSpPr>
+          <p:nvPr>
+            <p:ph idx="1"/>
+          </p:nvPr>
+        </p:nvSpPr>
+        <p:spPr>
+          <a:xfrm>
+            <a:off x="838200" y="2309719"/>
+            <a:ext cx="7703372" cy="3520926"/>
+          </a:xfrm>
+        </p:spPr>
+        <p:txBody>
+          <a:bodyPr>
+            <a:normAutofit/>
+          </a:bodyPr>
+          <a:lstStyle/>
+          <a:p>
+            <a:r>
+              <a:rPr lang="hu-HU" dirty="0" smtClean="0"/>
+              <a:t>GitHub.inc létrejöttének éve: 2007 (San Francisco)</a:t>
+            </a:r>
+          </a:p>
+          <a:p>
+            <a:r>
+              <a:rPr lang="hu-HU" dirty="0" smtClean="0"/>
+              <a:t>A </a:t>
+            </a:r>
+            <a:r>
+              <a:rPr lang="hu-HU" dirty="0" err="1" smtClean="0"/>
+              <a:t>GitHub</a:t>
+            </a:r>
+            <a:r>
+              <a:rPr lang="hu-HU" dirty="0" smtClean="0"/>
+              <a:t> (felület) létrejötte: 2008 február</a:t>
+            </a:r>
+          </a:p>
+          <a:p>
+            <a:r>
+              <a:rPr lang="hu-HU" dirty="0" smtClean="0"/>
+              <a:t>Több milliós támogatásokat szerzett</a:t>
+            </a:r>
+          </a:p>
+          <a:p>
+            <a:r>
+              <a:rPr lang="hu-HU" dirty="0" smtClean="0"/>
+              <a:t>(</a:t>
+            </a:r>
+            <a:r>
+              <a:rPr lang="hu-HU" dirty="0" err="1" smtClean="0"/>
+              <a:t>Andreessen</a:t>
+            </a:r>
+            <a:r>
+              <a:rPr lang="hu-HU" dirty="0" smtClean="0"/>
+              <a:t> Horowitz, </a:t>
+            </a:r>
+            <a:r>
+              <a:rPr lang="hu-HU" dirty="0" err="1" smtClean="0"/>
+              <a:t>Sequoia</a:t>
+            </a:r>
+            <a:r>
+              <a:rPr lang="hu-HU" dirty="0" smtClean="0"/>
+              <a:t> Capital…)</a:t>
+            </a:r>
+          </a:p>
+          <a:p>
+            <a:r>
+              <a:rPr lang="hu-HU" dirty="0" smtClean="0"/>
+              <a:t>Aktív felhasználók (2015): 3 millió</a:t>
+            </a:r>
+          </a:p>
+          <a:p>
+            <a:r>
+              <a:rPr lang="hu-HU" dirty="0" smtClean="0"/>
+              <a:t>2018: elszenvedte a 2. legnagyobb </a:t>
+            </a:r>
+            <a:r>
+              <a:rPr lang="hu-HU" dirty="0" err="1" smtClean="0"/>
+              <a:t>DDoS</a:t>
+            </a:r>
+            <a:r>
+              <a:rPr lang="hu-HU" dirty="0" smtClean="0"/>
+              <a:t> támadást (valaha)</a:t>
+            </a:r>
+          </a:p>
+        </p:txBody>
+      </p:sp>
+    </p:spTree>
+    <p:extLst>
+      <p:ext uri="{BB962C8B-B14F-4D97-AF65-F5344CB8AC3E}">
+        <p14:creationId xmlns:p14="http://schemas.microsoft.com/office/powerpoint/2010/main" val="825752884"/>
+      </p:ext>
+    </p:extLst>
+  </p:cSld>
+  <p:clrMapOvr>
+    <a:masterClrMapping/>
+  </p:clrMapOvr>
+  <p:timing>
+    <p:tnLst>
+      <p:par>
+        <p:cTn id="1" dur="indefinite" restart="never" nodeType="tmRoot"/>
+      </p:par>
+    </p:tnLst>
+  </p:timing>
+</p:sld>
+</file>
+
+<file path=ppt/slides/slide5.xml><?xml version="1.0" encoding="utf-8"?>
+<p:sld xmlns:a="http://schemas.openxmlformats.org/drawingml/2006/main" xmlns:r="http://schemas.openxmlformats.org/officeDocument/2006/relationships" xmlns:p="http://schemas.openxmlformats.org/presentationml/2006/main">
+  <p:cSld>
+    <p:spTree>
+      <p:nvGrpSpPr>
+        <p:cNvPr id="1" name=""/>
+        <p:cNvGrpSpPr/>
+        <p:nvPr/>
+      </p:nvGrpSpPr>
+      <p:grpSpPr>
+        <a:xfrm>
+          <a:off x="0" y="0"/>
+          <a:ext cx="0" cy="0"/>
+          <a:chOff x="0" y="0"/>
+          <a:chExt cx="0" cy="0"/>
+        </a:xfrm>
+      </p:grpSpPr>
+      <p:sp>
+        <p:nvSpPr>
+          <p:cNvPr id="2" name="Cím 1"/>
+          <p:cNvSpPr>
+            <a:spLocks noGrp="1"/>
+          </p:cNvSpPr>
+          <p:nvPr>
+            <p:ph type="title"/>
+          </p:nvPr>
+        </p:nvSpPr>
+        <p:spPr/>
+        <p:txBody>
+          <a:bodyPr>
+            <a:normAutofit/>
+          </a:bodyPr>
+          <a:lstStyle/>
+          <a:p>
+            <a:pPr algn="ctr"/>
+            <a:r>
+              <a:rPr lang="hu-HU" sz="6000" dirty="0" smtClean="0">
+                <a:latin typeface="Bahnschrift SemiBold" panose="020B0502040204020203" pitchFamily="34" charset="0"/>
+              </a:rPr>
+              <a:t>A Microsoft általi felvásárlás</a:t>
+            </a:r>
+            <a:endParaRPr lang="hu-HU" sz="6000" dirty="0">
+              <a:latin typeface="Bahnschrift SemiBold" panose="020B0502040204020203" pitchFamily="34" charset="0"/>
+            </a:endParaRPr>
+          </a:p>
+        </p:txBody>
+      </p:sp>
+      <p:sp>
+        <p:nvSpPr>
+          <p:cNvPr id="3" name="Tartalom helye 2"/>
+          <p:cNvSpPr>
+            <a:spLocks noGrp="1"/>
+          </p:cNvSpPr>
+          <p:nvPr>
+            <p:ph idx="1"/>
+          </p:nvPr>
+        </p:nvSpPr>
+        <p:spPr>
+          <a:xfrm>
+            <a:off x="838200" y="2062293"/>
+            <a:ext cx="5196839" cy="3886686"/>
+          </a:xfrm>
+        </p:spPr>
+        <p:txBody>
+          <a:bodyPr>
+            <a:normAutofit fontScale="92500" lnSpcReduction="10000"/>
+          </a:bodyPr>
+          <a:lstStyle/>
+          <a:p>
+            <a:r>
+              <a:rPr lang="hu-HU" dirty="0" smtClean="0"/>
+              <a:t>2018 június 4.: A Microsoft benyújtja igényét</a:t>
+            </a:r>
+          </a:p>
+          <a:p>
+            <a:r>
+              <a:rPr lang="hu-HU" dirty="0" smtClean="0"/>
+              <a:t>A felajánlott összeg 7,5 millió dollár</a:t>
+            </a:r>
+          </a:p>
+          <a:p>
+            <a:r>
+              <a:rPr lang="hu-HU" dirty="0" smtClean="0"/>
+              <a:t>(2018)június 4.-október 26.:Tárgyalások, az üzlet megköttetése</a:t>
+            </a:r>
+          </a:p>
+          <a:p>
+            <a:r>
+              <a:rPr lang="hu-HU" dirty="0" smtClean="0"/>
+              <a:t>2018 október 26.: Lezárulnak a tárgyalások, az üzlet maga is</a:t>
+            </a:r>
+          </a:p>
+          <a:p>
+            <a:r>
+              <a:rPr lang="hu-HU" dirty="0" smtClean="0"/>
+              <a:t>A platform önálló maradt, mint közösség, és szolgáltatás</a:t>
+            </a:r>
+            <a:endParaRPr lang="hu-HU" dirty="0"/>
+          </a:p>
+        </p:txBody>
+      </p:sp>
+      <p:pic>
+        <p:nvPicPr>
+          <p:cNvPr id="4" name="Kép 3"/>
+          <p:cNvPicPr>
+            <a:picLocks noChangeAspect="1"/>
+          </p:cNvPicPr>
+          <p:nvPr/>
+        </p:nvPicPr>
+        <p:blipFill>
+          <a:blip r:embed="rId2">
+            <a:extLst>
+              <a:ext uri="{28A0092B-C50C-407E-A947-70E740481C1C}">
+                <a14:useLocalDpi xmlns:a14="http://schemas.microsoft.com/office/drawing/2010/main" val="0"/>
+              </a:ext>
+            </a:extLst>
+          </a:blip>
+          <a:stretch>
+            <a:fillRect/>
+          </a:stretch>
+        </p:blipFill>
+        <p:spPr>
+          <a:xfrm>
+            <a:off x="6035039" y="2649936"/>
+            <a:ext cx="4799933" cy="2711399"/>
+          </a:xfrm>
+          <a:prstGeom prst="rect">
+            <a:avLst/>
+          </a:prstGeom>
+        </p:spPr>
+      </p:pic>
+    </p:spTree>
+    <p:extLst>
+      <p:ext uri="{BB962C8B-B14F-4D97-AF65-F5344CB8AC3E}">
+        <p14:creationId xmlns:p14="http://schemas.microsoft.com/office/powerpoint/2010/main" val="853832614"/>
+      </p:ext>
+    </p:extLst>
+  </p:cSld>
+  <p:clrMapOvr>
+    <a:masterClrMapping/>
+  </p:clrMapOvr>
+  <mc:AlternateContent xmlns:mc="http://schemas.openxmlformats.org/markup-compatibility/2006">
+    <mc:Choice xmlns:p14="http://schemas.microsoft.com/office/powerpoint/2010/main" Requires="p14">
+      <p:transition p14:dur="0"/>
+    </mc:Choice>
+    <mc:Fallback>
+      <p:transition/>
+    </mc:Fallback>
+  </mc:AlternateContent>
+  <p:timing>
+    <p:tnLst>
+      <p:par>
+        <p:cTn id="1" dur="indefinite" restart="never" nodeType="tmRoot">
+          <p:childTnLst>
+            <p:seq concurrent="1" nextAc="seek">
+              <p:cTn id="2" dur="indefinite" nodeType="mainSeq">
+                <p:childTnLst>
+                  <p:par>
+                    <p:cTn id="3" fill="hold">
+                      <p:stCondLst>
+                        <p:cond delay="indefinite"/>
+                      </p:stCondLst>
+                      <p:childTnLst>
+                        <p:par>
+                          <p:cTn id="4" fill="hold">
+                            <p:stCondLst>
+                              <p:cond delay="0"/>
+                            </p:stCondLst>
+                            <p:childTnLst>
+                              <p:par>
+                                <p:cTn id="5" presetID="10" presetClass="entr" presetSubtype="0" fill="hold" grpId="0" nodeType="clickEffect">
+                                  <p:stCondLst>
+                                    <p:cond delay="0"/>
+                                  </p:stCondLst>
+                                  <p:childTnLst>
+                                    <p:set>
+                                      <p:cBhvr>
+                                        <p:cTn id="6" dur="1" fill="hold">
+                                          <p:stCondLst>
+                                            <p:cond delay="0"/>
+                                          </p:stCondLst>
+                                        </p:cTn>
+                                        <p:tgtEl>
+                                          <p:spTgt spid="2"/>
+                                        </p:tgtEl>
+                                        <p:attrNameLst>
+                                          <p:attrName>style.visibility</p:attrName>
+                                        </p:attrNameLst>
+                                      </p:cBhvr>
+                                      <p:to>
+                                        <p:strVal val="visible"/>
+                                      </p:to>
+                                    </p:set>
+                                    <p:animEffect transition="in" filter="fade">
+                                      <p:cBhvr>
+                                        <p:cTn id="7" dur="500"/>
+                                        <p:tgtEl>
+                                          <p:spTgt spid="2"/>
+                                        </p:tgtEl>
+                                      </p:cBhvr>
+                                    </p:animEffect>
+                                  </p:childTnLst>
+                                </p:cTn>
+                              </p:par>
+                            </p:childTnLst>
+                          </p:cTn>
+                        </p:par>
+                      </p:childTnLst>
+                    </p:cTn>
+                  </p:par>
+                  <p:par>
+                    <p:cTn id="8" fill="hold">
+                      <p:stCondLst>
+                        <p:cond delay="indefinite"/>
+                      </p:stCondLst>
+                      <p:childTnLst>
+                        <p:par>
+                          <p:cTn id="9" fill="hold">
+                            <p:stCondLst>
+                              <p:cond delay="0"/>
+                            </p:stCondLst>
+                            <p:childTnLst>
+                              <p:par>
+                                <p:cTn id="10" presetID="10" presetClass="entr" presetSubtype="0" fill="hold" nodeType="clickEffect">
+                                  <p:stCondLst>
+                                    <p:cond delay="0"/>
+                                  </p:stCondLst>
+                                  <p:childTnLst>
+                                    <p:set>
+                                      <p:cBhvr>
+                                        <p:cTn id="11" dur="1" fill="hold">
+                                          <p:stCondLst>
+                                            <p:cond delay="0"/>
+                                          </p:stCondLst>
+                                        </p:cTn>
+                                        <p:tgtEl>
+                                          <p:spTgt spid="3">
+                                            <p:txEl>
+                                              <p:pRg st="0" end="0"/>
+                                            </p:txEl>
+                                          </p:spTgt>
+                                        </p:tgtEl>
+                                        <p:attrNameLst>
+                                          <p:attrName>style.visibility</p:attrName>
+                                        </p:attrNameLst>
+                                      </p:cBhvr>
+                                      <p:to>
+                                        <p:strVal val="visible"/>
+                                      </p:to>
+                                    </p:set>
+                                    <p:animEffect transition="in" filter="fade">
+                                      <p:cBhvr>
+                                        <p:cTn id="12" dur="500"/>
+                                        <p:tgtEl>
+                                          <p:spTgt spid="3">
+                                            <p:txEl>
+                                              <p:pRg st="0" end="0"/>
+                                            </p:txEl>
+                                          </p:spTgt>
+                                        </p:tgtEl>
+                                      </p:cBhvr>
+                                    </p:animEffect>
+                                  </p:childTnLst>
+                                </p:cTn>
+                              </p:par>
+                              <p:par>
+                                <p:cTn id="13" presetID="10" presetClass="entr" presetSubtype="0" fill="hold" nodeType="withEffect">
+                                  <p:stCondLst>
+                                    <p:cond delay="0"/>
+                                  </p:stCondLst>
+                                  <p:childTnLst>
+                                    <p:set>
+                                      <p:cBhvr>
+                                        <p:cTn id="14" dur="1" fill="hold">
+                                          <p:stCondLst>
+                                            <p:cond delay="0"/>
+                                          </p:stCondLst>
+                                        </p:cTn>
+                                        <p:tgtEl>
+                                          <p:spTgt spid="3">
+                                            <p:txEl>
+                                              <p:pRg st="1" end="1"/>
+                                            </p:txEl>
+                                          </p:spTgt>
+                                        </p:tgtEl>
+                                        <p:attrNameLst>
+                                          <p:attrName>style.visibility</p:attrName>
+                                        </p:attrNameLst>
+                                      </p:cBhvr>
+                                      <p:to>
+                                        <p:strVal val="visible"/>
+                                      </p:to>
+                                    </p:set>
+                                    <p:animEffect transition="in" filter="fade">
+                                      <p:cBhvr>
+                                        <p:cTn id="15" dur="500"/>
+                                        <p:tgtEl>
+                                          <p:spTgt spid="3">
+                                            <p:txEl>
+                                              <p:pRg st="1" end="1"/>
+                                            </p:txEl>
+                                          </p:spTgt>
+                                        </p:tgtEl>
+                                      </p:cBhvr>
+                                    </p:animEffect>
+                                  </p:childTnLst>
+                                </p:cTn>
+                              </p:par>
+                              <p:par>
+                                <p:cTn id="16" presetID="10" presetClass="entr" presetSubtype="0" fill="hold" nodeType="withEffect">
+                                  <p:stCondLst>
+                                    <p:cond delay="0"/>
+                                  </p:stCondLst>
+                                  <p:childTnLst>
+                                    <p:set>
+                                      <p:cBhvr>
+                                        <p:cTn id="17" dur="1" fill="hold">
+                                          <p:stCondLst>
+                                            <p:cond delay="0"/>
+                                          </p:stCondLst>
+                                        </p:cTn>
+                                        <p:tgtEl>
+                                          <p:spTgt spid="3">
+                                            <p:txEl>
+                                              <p:pRg st="2" end="2"/>
+                                            </p:txEl>
+                                          </p:spTgt>
+                                        </p:tgtEl>
+                                        <p:attrNameLst>
+                                          <p:attrName>style.visibility</p:attrName>
+                                        </p:attrNameLst>
+                                      </p:cBhvr>
+                                      <p:to>
+                                        <p:strVal val="visible"/>
+                                      </p:to>
+                                    </p:set>
+                                    <p:animEffect transition="in" filter="fade">
+                                      <p:cBhvr>
+                                        <p:cTn id="18" dur="500"/>
+                                        <p:tgtEl>
+                                          <p:spTgt spid="3">
+                                            <p:txEl>
+                                              <p:pRg st="2" end="2"/>
+                                            </p:txEl>
+                                          </p:spTgt>
+                                        </p:tgtEl>
+                                      </p:cBhvr>
+                                    </p:animEffect>
+                                  </p:childTnLst>
+                                </p:cTn>
+                              </p:par>
+                              <p:par>
+                                <p:cTn id="19" presetID="10" presetClass="entr" presetSubtype="0" fill="hold" nodeType="withEffect">
+                                  <p:stCondLst>
+                                    <p:cond delay="0"/>
+                                  </p:stCondLst>
+                                  <p:childTnLst>
+                                    <p:set>
+                                      <p:cBhvr>
+                                        <p:cTn id="20" dur="1" fill="hold">
+                                          <p:stCondLst>
+                                            <p:cond delay="0"/>
+                                          </p:stCondLst>
+                                        </p:cTn>
+                                        <p:tgtEl>
+                                          <p:spTgt spid="3">
+                                            <p:txEl>
+                                              <p:pRg st="3" end="3"/>
+                                            </p:txEl>
+                                          </p:spTgt>
+                                        </p:tgtEl>
+                                        <p:attrNameLst>
+                                          <p:attrName>style.visibility</p:attrName>
+                                        </p:attrNameLst>
+                                      </p:cBhvr>
+                                      <p:to>
+                                        <p:strVal val="visible"/>
+                                      </p:to>
+                                    </p:set>
+                                    <p:animEffect transition="in" filter="fade">
+                                      <p:cBhvr>
+                                        <p:cTn id="21" dur="500"/>
+                                        <p:tgtEl>
+                                          <p:spTgt spid="3">
+                                            <p:txEl>
+                                              <p:pRg st="3" end="3"/>
+                                            </p:txEl>
+                                          </p:spTgt>
+                                        </p:tgtEl>
+                                      </p:cBhvr>
+                                    </p:animEffect>
+                                  </p:childTnLst>
+                                </p:cTn>
+                              </p:par>
+                              <p:par>
+                                <p:cTn id="22" presetID="10" presetClass="entr" presetSubtype="0" fill="hold" nodeType="withEffect">
+                                  <p:stCondLst>
+                                    <p:cond delay="0"/>
+                                  </p:stCondLst>
+                                  <p:childTnLst>
+                                    <p:set>
+                                      <p:cBhvr>
+                                        <p:cTn id="23" dur="1" fill="hold">
+                                          <p:stCondLst>
+                                            <p:cond delay="0"/>
+                                          </p:stCondLst>
+                                        </p:cTn>
+                                        <p:tgtEl>
+                                          <p:spTgt spid="3">
+                                            <p:txEl>
+                                              <p:pRg st="4" end="4"/>
+                                            </p:txEl>
+                                          </p:spTgt>
+                                        </p:tgtEl>
+                                        <p:attrNameLst>
+                                          <p:attrName>style.visibility</p:attrName>
+                                        </p:attrNameLst>
+                                      </p:cBhvr>
+                                      <p:to>
+                                        <p:strVal val="visible"/>
+                                      </p:to>
+                                    </p:set>
+                                    <p:animEffect transition="in" filter="fade">
+                                      <p:cBhvr>
+                                        <p:cTn id="24" dur="500"/>
+                                        <p:tgtEl>
+                                          <p:spTgt spid="3">
+                                            <p:txEl>
+                                              <p:pRg st="4" end="4"/>
+                                            </p:txEl>
+                                          </p:spTgt>
+                                        </p:tgtEl>
+                                      </p:cBhvr>
+                                    </p:animEffect>
+                                  </p:childTnLst>
+                                </p:cTn>
+                              </p:par>
+                            </p:childTnLst>
+                          </p:cTn>
+                        </p:par>
+                      </p:childTnLst>
+                    </p:cTn>
+                  </p:par>
+                  <p:par>
+                    <p:cTn id="25" fill="hold">
+                      <p:stCondLst>
+                        <p:cond delay="indefinite"/>
+                      </p:stCondLst>
+                      <p:childTnLst>
+                        <p:par>
+                          <p:cTn id="26" fill="hold">
+                            <p:stCondLst>
+                              <p:cond delay="0"/>
+                            </p:stCondLst>
+                            <p:childTnLst>
+                              <p:par>
+                                <p:cTn id="27" presetID="10" presetClass="entr" presetSubtype="0" fill="hold" nodeType="clickEffect">
+                                  <p:stCondLst>
+                                    <p:cond delay="0"/>
+                                  </p:stCondLst>
+                                  <p:childTnLst>
+                                    <p:set>
+                                      <p:cBhvr>
+                                        <p:cTn id="28" dur="1" fill="hold">
+                                          <p:stCondLst>
+                                            <p:cond delay="0"/>
+                                          </p:stCondLst>
+                                        </p:cTn>
+                                        <p:tgtEl>
+                                          <p:spTgt spid="4"/>
+                                        </p:tgtEl>
+                                        <p:attrNameLst>
+                                          <p:attrName>style.visibility</p:attrName>
+                                        </p:attrNameLst>
+                                      </p:cBhvr>
+                                      <p:to>
+                                        <p:strVal val="visible"/>
+                                      </p:to>
+                                    </p:set>
+                                    <p:animEffect transition="in" filter="fade">
+                                      <p:cBhvr>
+                                        <p:cTn id="29" dur="500"/>
+                                        <p:tgtEl>
+                                          <p:spTgt spid="4"/>
+                                        </p:tgtEl>
+                                      </p:cBhvr>
+                                    </p:animEffect>
+                                  </p:childTnLst>
+                                </p:cTn>
+                              </p:par>
+                            </p:childTnLst>
+                          </p:cTn>
+                        </p:par>
+                      </p:childTnLst>
+                    </p:cTn>
+                  </p:par>
+                </p:childTnLst>
+              </p:cTn>
+              <p:prevCondLst>
+                <p:cond evt="onPrev" delay="0">
+                  <p:tgtEl>
+                    <p:sldTgt/>
+                  </p:tgtEl>
+                </p:cond>
+              </p:prevCondLst>
+              <p:nextCondLst>
+                <p:cond evt="onNext" delay="0">
+                  <p:tgtEl>
+                    <p:sldTgt/>
+                  </p:tgtEl>
+                </p:cond>
+              </p:nextCondLst>
+            </p:seq>
+          </p:childTnLst>
+        </p:cTn>
+      </p:par>
+    </p:tnLst>
+    <p:bldLst>
+      <p:bldP spid="2" grpId="0"/>
+    </p:bldLst>
+  </p:timing>
+</p:sld>
+</file>
+
+<file path=ppt/slides/slide6.xml><?xml version="1.0" encoding="utf-8"?>
+<p:sld xmlns:a="http://schemas.openxmlformats.org/drawingml/2006/main" xmlns:r="http://schemas.openxmlformats.org/officeDocument/2006/relationships" xmlns:p="http://schemas.openxmlformats.org/presentationml/2006/main">
+  <p:cSld>
+    <p:spTree>
+      <p:nvGrpSpPr>
+        <p:cNvPr id="1" name=""/>
+        <p:cNvGrpSpPr/>
+        <p:nvPr/>
+      </p:nvGrpSpPr>
+      <p:grpSpPr>
+        <a:xfrm>
+          <a:off x="0" y="0"/>
+          <a:ext cx="0" cy="0"/>
+          <a:chOff x="0" y="0"/>
+          <a:chExt cx="0" cy="0"/>
+        </a:xfrm>
+      </p:grpSpPr>
+      <p:sp>
+        <p:nvSpPr>
+          <p:cNvPr id="2" name="Cím 1"/>
+          <p:cNvSpPr>
+            <a:spLocks noGrp="1"/>
+          </p:cNvSpPr>
+          <p:nvPr>
+            <p:ph type="title"/>
+          </p:nvPr>
+        </p:nvSpPr>
+        <p:spPr/>
+        <p:txBody>
+          <a:bodyPr>
+            <a:normAutofit/>
+          </a:bodyPr>
+          <a:lstStyle/>
+          <a:p>
+            <a:pPr algn="ctr"/>
+            <a:r>
+              <a:rPr lang="hu-HU" sz="6000" dirty="0" smtClean="0">
+                <a:latin typeface="Bahnschrift SemiBold" panose="020B0502040204020203" pitchFamily="34" charset="0"/>
+              </a:rPr>
+              <a:t>A felvásárlás következményei</a:t>
+            </a:r>
+            <a:endParaRPr lang="hu-HU" sz="6000" dirty="0">
+              <a:latin typeface="Bahnschrift SemiBold" panose="020B0502040204020203" pitchFamily="34" charset="0"/>
+            </a:endParaRPr>
+          </a:p>
+        </p:txBody>
+      </p:sp>
+      <p:sp>
+        <p:nvSpPr>
+          <p:cNvPr id="3" name="Tartalom helye 2"/>
+          <p:cNvSpPr>
+            <a:spLocks noGrp="1"/>
+          </p:cNvSpPr>
+          <p:nvPr>
+            <p:ph idx="1"/>
+          </p:nvPr>
+        </p:nvSpPr>
+        <p:spPr>
+          <a:xfrm>
+            <a:off x="838200" y="2159111"/>
+            <a:ext cx="8542468" cy="4166384"/>
+          </a:xfrm>
+        </p:spPr>
+        <p:txBody>
+          <a:bodyPr>
+            <a:normAutofit/>
+          </a:bodyPr>
+          <a:lstStyle/>
+          <a:p>
+            <a:r>
+              <a:rPr lang="hu-HU" dirty="0" smtClean="0"/>
+              <a:t>A Microsoft a program aktív felhasználója lett</a:t>
+            </a:r>
+          </a:p>
+          <a:p>
+            <a:r>
+              <a:rPr lang="hu-HU" dirty="0" smtClean="0"/>
+              <a:t>A vásárlás oka: több felhasználó elérése (=üzleti stratégia)</a:t>
+            </a:r>
+          </a:p>
+          <a:p>
+            <a:r>
+              <a:rPr lang="hu-HU" dirty="0" smtClean="0"/>
+              <a:t>Az aggályok növelték a konkurens cégek számait</a:t>
+            </a:r>
+          </a:p>
+          <a:p>
+            <a:r>
+              <a:rPr lang="hu-HU" dirty="0" smtClean="0"/>
+              <a:t>(</a:t>
+            </a:r>
+            <a:r>
+              <a:rPr lang="hu-HU" dirty="0" err="1" smtClean="0"/>
+              <a:t>GitLab</a:t>
+            </a:r>
+            <a:r>
+              <a:rPr lang="hu-HU" dirty="0" smtClean="0"/>
+              <a:t>, </a:t>
+            </a:r>
+            <a:r>
+              <a:rPr lang="hu-HU" dirty="0" err="1" smtClean="0"/>
+              <a:t>Bitbucket</a:t>
+            </a:r>
+            <a:r>
+              <a:rPr lang="hu-HU" dirty="0" smtClean="0"/>
+              <a:t>…)</a:t>
+            </a:r>
+          </a:p>
+          <a:p>
+            <a:r>
+              <a:rPr lang="hu-HU" dirty="0" smtClean="0"/>
+              <a:t>A </a:t>
+            </a:r>
+            <a:r>
+              <a:rPr lang="hu-HU" dirty="0" err="1" smtClean="0"/>
+              <a:t>GitHubot</a:t>
+            </a:r>
+            <a:r>
+              <a:rPr lang="hu-HU" dirty="0" smtClean="0"/>
+              <a:t> elkezdte támogatni A VS </a:t>
+            </a:r>
+            <a:r>
+              <a:rPr lang="hu-HU" dirty="0" err="1" smtClean="0"/>
+              <a:t>Code</a:t>
+            </a:r>
+            <a:endParaRPr lang="hu-HU" dirty="0" smtClean="0"/>
+          </a:p>
+          <a:p>
+            <a:r>
+              <a:rPr lang="hu-HU" dirty="0" smtClean="0"/>
+              <a:t>(sok más program is)</a:t>
+            </a:r>
+            <a:endParaRPr lang="hu-HU" dirty="0"/>
+          </a:p>
+        </p:txBody>
+      </p:sp>
+    </p:spTree>
+    <p:extLst>
+      <p:ext uri="{BB962C8B-B14F-4D97-AF65-F5344CB8AC3E}">
+        <p14:creationId xmlns:p14="http://schemas.microsoft.com/office/powerpoint/2010/main" val="1073577414"/>
+      </p:ext>
+    </p:extLst>
+  </p:cSld>
+  <p:clrMapOvr>
+    <a:masterClrMapping/>
+  </p:clrMapOvr>
+  <p:timing>
+    <p:tnLst>
+      <p:par>
+        <p:cTn id="1" dur="indefinite" restart="never" nodeType="tmRoot">
+          <p:childTnLst>
+            <p:seq concurrent="1" nextAc="seek">
+              <p:cTn id="2" dur="indefinite" nodeType="mainSeq">
+                <p:childTnLst>
+                  <p:par>
+                    <p:cTn id="3" fill="hold">
+                      <p:stCondLst>
+                        <p:cond delay="indefinite"/>
+                      </p:stCondLst>
+                      <p:childTnLst>
+                        <p:par>
+                          <p:cTn id="4" fill="hold">
+                            <p:stCondLst>
+                              <p:cond delay="0"/>
+                            </p:stCondLst>
+                            <p:childTnLst>
+                              <p:par>
+                                <p:cTn id="5" presetID="10" presetClass="entr" presetSubtype="0" fill="hold" grpId="0" nodeType="clickEffect">
+                                  <p:stCondLst>
+                                    <p:cond delay="0"/>
+                                  </p:stCondLst>
+                                  <p:childTnLst>
+                                    <p:set>
+                                      <p:cBhvr>
+                                        <p:cTn id="6" dur="1" fill="hold">
+                                          <p:stCondLst>
+                                            <p:cond delay="0"/>
+                                          </p:stCondLst>
+                                        </p:cTn>
+                                        <p:tgtEl>
+                                          <p:spTgt spid="2"/>
+                                        </p:tgtEl>
+                                        <p:attrNameLst>
+                                          <p:attrName>style.visibility</p:attrName>
+                                        </p:attrNameLst>
+                                      </p:cBhvr>
+                                      <p:to>
+                                        <p:strVal val="visible"/>
+                                      </p:to>
+                                    </p:set>
+                                    <p:animEffect transition="in" filter="fade">
+                                      <p:cBhvr>
+                                        <p:cTn id="7" dur="500"/>
+                                        <p:tgtEl>
+                                          <p:spTgt spid="2"/>
+                                        </p:tgtEl>
+                                      </p:cBhvr>
+                                    </p:animEffect>
+                                  </p:childTnLst>
+                                </p:cTn>
+                              </p:par>
+                            </p:childTnLst>
+                          </p:cTn>
+                        </p:par>
+                      </p:childTnLst>
+                    </p:cTn>
+                  </p:par>
+                </p:childTnLst>
+              </p:cTn>
+              <p:prevCondLst>
+                <p:cond evt="onPrev" delay="0">
+                  <p:tgtEl>
+                    <p:sldTgt/>
+                  </p:tgtEl>
+                </p:cond>
+              </p:prevCondLst>
+              <p:nextCondLst>
+                <p:cond evt="onNext" delay="0">
+                  <p:tgtEl>
+                    <p:sldTgt/>
+                  </p:tgtEl>
+                </p:cond>
+              </p:nextCondLst>
+            </p:seq>
+          </p:childTnLst>
+        </p:cTn>
+      </p:par>
+    </p:tnLst>
+    <p:bldLst>
+      <p:bldP spid="2" grpId="0"/>
+    </p:bldLst>
+  </p:timing>
+</p:sld>
+</file>
+
+<file path=ppt/slides/slide7.xml><?xml version="1.0" encoding="utf-8"?>
+<p:sld xmlns:a="http://schemas.openxmlformats.org/drawingml/2006/main" xmlns:r="http://schemas.openxmlformats.org/officeDocument/2006/relationships" xmlns:p="http://schemas.openxmlformats.org/presentationml/2006/main">
+  <p:cSld>
+    <p:spTree>
+      <p:nvGrpSpPr>
+        <p:cNvPr id="1" name=""/>
+        <p:cNvGrpSpPr/>
+        <p:nvPr/>
+      </p:nvGrpSpPr>
+      <p:grpSpPr>
+        <a:xfrm>
+          <a:off x="0" y="0"/>
+          <a:ext cx="0" cy="0"/>
+          <a:chOff x="0" y="0"/>
+          <a:chExt cx="0" cy="0"/>
+        </a:xfrm>
+      </p:grpSpPr>
+      <p:sp>
+        <p:nvSpPr>
+          <p:cNvPr id="2" name="Cím 1"/>
+          <p:cNvSpPr>
+            <a:spLocks noGrp="1"/>
+          </p:cNvSpPr>
+          <p:nvPr>
+            <p:ph type="title"/>
+          </p:nvPr>
+        </p:nvSpPr>
+        <p:spPr/>
+        <p:txBody>
+          <a:bodyPr>
+            <a:normAutofit/>
+          </a:bodyPr>
+          <a:lstStyle/>
+          <a:p>
+            <a:pPr algn="ctr"/>
+            <a:r>
+              <a:rPr lang="hu-HU" sz="6000" dirty="0" smtClean="0">
+                <a:latin typeface="Bahnschrift SemiBold" panose="020B0502040204020203" pitchFamily="34" charset="0"/>
+              </a:rPr>
+              <a:t>Összegzés</a:t>
+            </a:r>
+            <a:endParaRPr lang="hu-HU" sz="6000" dirty="0">
+              <a:latin typeface="Bahnschrift SemiBold" panose="020B0502040204020203" pitchFamily="34" charset="0"/>
+            </a:endParaRPr>
+          </a:p>
+        </p:txBody>
+      </p:sp>
+      <p:sp>
+        <p:nvSpPr>
+          <p:cNvPr id="3" name="Tartalom helye 2"/>
+          <p:cNvSpPr>
+            <a:spLocks noGrp="1"/>
+          </p:cNvSpPr>
+          <p:nvPr>
+            <p:ph idx="1"/>
+          </p:nvPr>
+        </p:nvSpPr>
+        <p:spPr/>
+        <p:txBody>
+          <a:bodyPr/>
+          <a:lstStyle/>
+          <a:p>
+            <a:endParaRPr lang="hu-HU" dirty="0"/>
+          </a:p>
+        </p:txBody>
+      </p:sp>
+    </p:spTree>
+    <p:extLst>
+      <p:ext uri="{BB962C8B-B14F-4D97-AF65-F5344CB8AC3E}">
+        <p14:creationId xmlns:p14="http://schemas.microsoft.com/office/powerpoint/2010/main" val="3955566651"/>
+      </p:ext>
+    </p:extLst>
+  </p:cSld>
+  <p:clrMapOvr>
+    <a:masterClrMapping/>
+  </p:clrMapOvr>
+  <p:timing>
+    <p:tnLst>
+      <p:par>
+        <p:cTn id="1" dur="indefinite" restart="never" nodeType="tmRoot"/>
+      </p:par>
+    </p:tnLst>
+  </p:timing>
+</p:sld>
+</file>
+
+<file path=ppt/slides/slide8.xml><?xml version="1.0" encoding="utf-8"?>
+<p:sld xmlns:a="http://schemas.openxmlformats.org/drawingml/2006/main" xmlns:r="http://schemas.openxmlformats.org/officeDocument/2006/relationships" xmlns:p="http://schemas.openxmlformats.org/presentationml/2006/main">
+  <p:cSld>
+    <p:spTree>
+      <p:nvGrpSpPr>
+        <p:cNvPr id="1" name=""/>
+        <p:cNvGrpSpPr/>
+        <p:nvPr/>
+      </p:nvGrpSpPr>
+      <p:grpSpPr>
+        <a:xfrm>
+          <a:off x="0" y="0"/>
+          <a:ext cx="0" cy="0"/>
+          <a:chOff x="0" y="0"/>
+          <a:chExt cx="0" cy="0"/>
+        </a:xfrm>
+      </p:grpSpPr>
+      <p:sp>
+        <p:nvSpPr>
+          <p:cNvPr id="4" name="Cím 3"/>
+          <p:cNvSpPr>
+            <a:spLocks noGrp="1"/>
+          </p:cNvSpPr>
+          <p:nvPr>
+            <p:ph type="ctrTitle"/>
+          </p:nvPr>
+        </p:nvSpPr>
+        <p:spPr/>
+        <p:txBody>
+          <a:bodyPr/>
+          <a:lstStyle/>
+          <a:p>
+            <a:r>
+              <a:rPr lang="hu-HU" dirty="0" smtClean="0"/>
+              <a:t>Köszönöm a figyelmet!</a:t>
+            </a:r>
+            <a:endParaRPr lang="hu-HU" dirty="0"/>
+          </a:p>
+        </p:txBody>
+      </p:sp>
+      <p:sp>
+        <p:nvSpPr>
+          <p:cNvPr id="5" name="Alcím 4"/>
+          <p:cNvSpPr>
+            <a:spLocks noGrp="1"/>
+          </p:cNvSpPr>
+          <p:nvPr>
+            <p:ph type="subTitle" idx="1"/>
+          </p:nvPr>
+        </p:nvSpPr>
+        <p:spPr/>
+        <p:txBody>
+          <a:bodyPr/>
+          <a:lstStyle/>
+          <a:p>
+            <a:endParaRPr lang="hu-HU"/>
+          </a:p>
+        </p:txBody>
+      </p:sp>
+    </p:spTree>
+    <p:extLst>
+      <p:ext uri="{BB962C8B-B14F-4D97-AF65-F5344CB8AC3E}">
+        <p14:creationId xmlns:p14="http://schemas.microsoft.com/office/powerpoint/2010/main" val="4009054043"/>
+      </p:ext>
+    </p:extLst>
+  </p:cSld>
+  <p:clrMapOvr>
+    <a:masterClrMapping/>
+  </p:clrMapOvr>
+  <p:timing>
+    <p:tnLst>
+      <p:par>
+        <p:cTn id="1" dur="indefinite" restart="never" nodeType="tmRoot"/>
+      </p:par>
+    </p:tnLst>
+  </p:timing>
 </p:sld>
 </file>
 

</xml_diff>

<commit_message>
Diasor befejezése, animációk hozzáadása...
</commit_message>
<xml_diff>
--- a/A GitHub.pptx
+++ b/A GitHub.pptx
@@ -250,7 +250,7 @@
           <a:p>
             <a:fld id="{2CB50A5F-5272-451B-89D3-66DFC9125D9E}" type="datetimeFigureOut">
               <a:rPr lang="hu-HU" smtClean="0"/>
-              <a:t>2022.09.21.</a:t>
+              <a:t>2022.09.22.</a:t>
             </a:fld>
             <a:endParaRPr lang="hu-HU"/>
           </a:p>
@@ -420,7 +420,7 @@
           <a:p>
             <a:fld id="{2CB50A5F-5272-451B-89D3-66DFC9125D9E}" type="datetimeFigureOut">
               <a:rPr lang="hu-HU" smtClean="0"/>
-              <a:t>2022.09.21.</a:t>
+              <a:t>2022.09.22.</a:t>
             </a:fld>
             <a:endParaRPr lang="hu-HU"/>
           </a:p>
@@ -600,7 +600,7 @@
           <a:p>
             <a:fld id="{2CB50A5F-5272-451B-89D3-66DFC9125D9E}" type="datetimeFigureOut">
               <a:rPr lang="hu-HU" smtClean="0"/>
-              <a:t>2022.09.21.</a:t>
+              <a:t>2022.09.22.</a:t>
             </a:fld>
             <a:endParaRPr lang="hu-HU"/>
           </a:p>
@@ -770,7 +770,7 @@
           <a:p>
             <a:fld id="{2CB50A5F-5272-451B-89D3-66DFC9125D9E}" type="datetimeFigureOut">
               <a:rPr lang="hu-HU" smtClean="0"/>
-              <a:t>2022.09.21.</a:t>
+              <a:t>2022.09.22.</a:t>
             </a:fld>
             <a:endParaRPr lang="hu-HU"/>
           </a:p>
@@ -1016,7 +1016,7 @@
           <a:p>
             <a:fld id="{2CB50A5F-5272-451B-89D3-66DFC9125D9E}" type="datetimeFigureOut">
               <a:rPr lang="hu-HU" smtClean="0"/>
-              <a:t>2022.09.21.</a:t>
+              <a:t>2022.09.22.</a:t>
             </a:fld>
             <a:endParaRPr lang="hu-HU"/>
           </a:p>
@@ -1248,7 +1248,7 @@
           <a:p>
             <a:fld id="{2CB50A5F-5272-451B-89D3-66DFC9125D9E}" type="datetimeFigureOut">
               <a:rPr lang="hu-HU" smtClean="0"/>
-              <a:t>2022.09.21.</a:t>
+              <a:t>2022.09.22.</a:t>
             </a:fld>
             <a:endParaRPr lang="hu-HU"/>
           </a:p>
@@ -1615,7 +1615,7 @@
           <a:p>
             <a:fld id="{2CB50A5F-5272-451B-89D3-66DFC9125D9E}" type="datetimeFigureOut">
               <a:rPr lang="hu-HU" smtClean="0"/>
-              <a:t>2022.09.21.</a:t>
+              <a:t>2022.09.22.</a:t>
             </a:fld>
             <a:endParaRPr lang="hu-HU"/>
           </a:p>
@@ -1733,7 +1733,7 @@
           <a:p>
             <a:fld id="{2CB50A5F-5272-451B-89D3-66DFC9125D9E}" type="datetimeFigureOut">
               <a:rPr lang="hu-HU" smtClean="0"/>
-              <a:t>2022.09.21.</a:t>
+              <a:t>2022.09.22.</a:t>
             </a:fld>
             <a:endParaRPr lang="hu-HU"/>
           </a:p>
@@ -1828,7 +1828,7 @@
           <a:p>
             <a:fld id="{2CB50A5F-5272-451B-89D3-66DFC9125D9E}" type="datetimeFigureOut">
               <a:rPr lang="hu-HU" smtClean="0"/>
-              <a:t>2022.09.21.</a:t>
+              <a:t>2022.09.22.</a:t>
             </a:fld>
             <a:endParaRPr lang="hu-HU"/>
           </a:p>
@@ -2105,7 +2105,7 @@
           <a:p>
             <a:fld id="{2CB50A5F-5272-451B-89D3-66DFC9125D9E}" type="datetimeFigureOut">
               <a:rPr lang="hu-HU" smtClean="0"/>
-              <a:t>2022.09.21.</a:t>
+              <a:t>2022.09.22.</a:t>
             </a:fld>
             <a:endParaRPr lang="hu-HU"/>
           </a:p>
@@ -2362,7 +2362,7 @@
           <a:p>
             <a:fld id="{2CB50A5F-5272-451B-89D3-66DFC9125D9E}" type="datetimeFigureOut">
               <a:rPr lang="hu-HU" smtClean="0"/>
-              <a:t>2022.09.21.</a:t>
+              <a:t>2022.09.22.</a:t>
             </a:fld>
             <a:endParaRPr lang="hu-HU"/>
           </a:p>
@@ -2575,7 +2575,7 @@
           <a:p>
             <a:fld id="{2CB50A5F-5272-451B-89D3-66DFC9125D9E}" type="datetimeFigureOut">
               <a:rPr lang="hu-HU" smtClean="0"/>
-              <a:t>2022.09.21.</a:t>
+              <a:t>2022.09.22.</a:t>
             </a:fld>
             <a:endParaRPr lang="hu-HU"/>
           </a:p>
@@ -3032,7 +3032,7 @@
         </p:nvSpPr>
         <p:spPr>
           <a:xfrm>
-            <a:off x="1524000" y="4903713"/>
+            <a:off x="1004047" y="4291574"/>
             <a:ext cx="9144000" cy="1655762"/>
           </a:xfrm>
         </p:spPr>
@@ -3127,13 +3127,13 @@
   <p:clrMapOvr>
     <a:masterClrMapping/>
   </p:clrMapOvr>
-  <mc:AlternateContent xmlns:mc="http://schemas.openxmlformats.org/markup-compatibility/2006">
-    <mc:Choice xmlns:p14="http://schemas.microsoft.com/office/powerpoint/2010/main" Requires="p14">
+  <mc:AlternateContent xmlns:mc="http://schemas.openxmlformats.org/markup-compatibility/2006" xmlns:p14="http://schemas.microsoft.com/office/powerpoint/2010/main">
+    <mc:Choice Requires="p14">
       <p:transition spd="med" p14:dur="700">
         <p:fade/>
       </p:transition>
     </mc:Choice>
-    <mc:Fallback>
+    <mc:Fallback xmlns="">
       <p:transition spd="med">
         <p:fade/>
       </p:transition>
@@ -3232,7 +3232,7 @@
           <a:p>
             <a:r>
               <a:rPr lang="hu-HU" sz="3000" dirty="0" smtClean="0">
-                <a:latin typeface="Bahnschrift SemiBold" panose="020B0502040204020203" pitchFamily="34" charset="0"/>
+                <a:latin typeface="Bahnschrift SemiBold SemiConden" panose="020B0502040204020203" pitchFamily="34" charset="0"/>
               </a:rPr>
               <a:t>Egyesült Államokbeli vállalat</a:t>
             </a:r>
@@ -3240,7 +3240,7 @@
           <a:p>
             <a:r>
               <a:rPr lang="hu-HU" sz="3000" dirty="0" smtClean="0">
-                <a:latin typeface="Bahnschrift SemiBold" panose="020B0502040204020203" pitchFamily="34" charset="0"/>
+                <a:latin typeface="Bahnschrift SemiBold SemiConden" panose="020B0502040204020203" pitchFamily="34" charset="0"/>
               </a:rPr>
               <a:t>Nemzetközi nagyvállalat</a:t>
             </a:r>
@@ -3248,13 +3248,13 @@
           <a:p>
             <a:r>
               <a:rPr lang="hu-HU" sz="3000" dirty="0" err="1" smtClean="0">
-                <a:latin typeface="Bahnschrift SemiBold" panose="020B0502040204020203" pitchFamily="34" charset="0"/>
+                <a:latin typeface="Bahnschrift SemiBold SemiConden" panose="020B0502040204020203" pitchFamily="34" charset="0"/>
               </a:rPr>
               <a:t>Git</a:t>
             </a:r>
             <a:r>
               <a:rPr lang="hu-HU" sz="3000" dirty="0" smtClean="0">
-                <a:latin typeface="Bahnschrift SemiBold" panose="020B0502040204020203" pitchFamily="34" charset="0"/>
+                <a:latin typeface="Bahnschrift SemiBold SemiConden" panose="020B0502040204020203" pitchFamily="34" charset="0"/>
               </a:rPr>
               <a:t> segítségével működik</a:t>
             </a:r>
@@ -3262,25 +3262,25 @@
           <a:p>
             <a:r>
               <a:rPr lang="hu-HU" sz="3000" dirty="0" err="1" smtClean="0">
-                <a:latin typeface="Bahnschrift SemiBold" panose="020B0502040204020203" pitchFamily="34" charset="0"/>
+                <a:latin typeface="Bahnschrift SemiBold SemiConden" panose="020B0502040204020203" pitchFamily="34" charset="0"/>
               </a:rPr>
               <a:t>Szoftv</a:t>
             </a:r>
             <a:r>
               <a:rPr lang="hu-HU" sz="3000" dirty="0" smtClean="0">
-                <a:latin typeface="Bahnschrift SemiBold" panose="020B0502040204020203" pitchFamily="34" charset="0"/>
+                <a:latin typeface="Bahnschrift SemiBold SemiConden" panose="020B0502040204020203" pitchFamily="34" charset="0"/>
               </a:rPr>
               <a:t>. </a:t>
             </a:r>
             <a:r>
               <a:rPr lang="hu-HU" sz="3000" dirty="0" err="1" smtClean="0">
-                <a:latin typeface="Bahnschrift SemiBold" panose="020B0502040204020203" pitchFamily="34" charset="0"/>
+                <a:latin typeface="Bahnschrift SemiBold SemiConden" panose="020B0502040204020203" pitchFamily="34" charset="0"/>
               </a:rPr>
               <a:t>Fejl</a:t>
             </a:r>
             <a:r>
               <a:rPr lang="hu-HU" sz="3000" dirty="0" smtClean="0">
-                <a:latin typeface="Bahnschrift SemiBold" panose="020B0502040204020203" pitchFamily="34" charset="0"/>
+                <a:latin typeface="Bahnschrift SemiBold SemiConden" panose="020B0502040204020203" pitchFamily="34" charset="0"/>
               </a:rPr>
               <a:t>. verziókezelést tesz lehetővé</a:t>
             </a:r>
@@ -3288,12 +3288,12 @@
           <a:p>
             <a:r>
               <a:rPr lang="hu-HU" sz="3000" dirty="0" smtClean="0">
-                <a:latin typeface="Bahnschrift SemiBold" panose="020B0502040204020203" pitchFamily="34" charset="0"/>
+                <a:latin typeface="Bahnschrift SemiBold SemiConden" panose="020B0502040204020203" pitchFamily="34" charset="0"/>
               </a:rPr>
               <a:t>Microsoft leányvállalata (7.5 millió dollár)</a:t>
             </a:r>
             <a:endParaRPr lang="hu-HU" sz="3000" dirty="0">
-              <a:latin typeface="Bahnschrift SemiBold" panose="020B0502040204020203" pitchFamily="34" charset="0"/>
+              <a:latin typeface="Bahnschrift SemiBold SemiConden" panose="020B0502040204020203" pitchFamily="34" charset="0"/>
             </a:endParaRPr>
           </a:p>
         </p:txBody>
@@ -3308,13 +3308,13 @@
   <p:clrMapOvr>
     <a:masterClrMapping/>
   </p:clrMapOvr>
-  <mc:AlternateContent xmlns:mc="http://schemas.openxmlformats.org/markup-compatibility/2006">
-    <mc:Choice xmlns:p14="http://schemas.microsoft.com/office/powerpoint/2010/main" Requires="p14">
+  <mc:AlternateContent xmlns:mc="http://schemas.openxmlformats.org/markup-compatibility/2006" xmlns:p14="http://schemas.microsoft.com/office/powerpoint/2010/main">
+    <mc:Choice Requires="p14">
       <p:transition spd="med" p14:dur="700">
         <p:fade/>
       </p:transition>
     </mc:Choice>
-    <mc:Fallback>
+    <mc:Fallback xmlns="">
       <p:transition spd="med">
         <p:fade/>
       </p:transition>
@@ -3671,17 +3671,19 @@
         </p:nvSpPr>
         <p:spPr/>
         <p:txBody>
-          <a:bodyPr/>
+          <a:bodyPr>
+            <a:normAutofit/>
+          </a:bodyPr>
           <a:lstStyle/>
           <a:p>
             <a:pPr algn="ctr"/>
             <a:r>
-              <a:rPr lang="hu-HU" dirty="0" smtClean="0">
+              <a:rPr lang="hu-HU" sz="6000" dirty="0" smtClean="0">
                 <a:latin typeface="Bahnschrift SemiBold" panose="020B0502040204020203" pitchFamily="34" charset="0"/>
               </a:rPr>
               <a:t>Miben vállhat a segítségünkre?</a:t>
             </a:r>
-            <a:endParaRPr lang="hu-HU" dirty="0">
+            <a:endParaRPr lang="hu-HU" sz="6000" dirty="0">
               <a:latin typeface="Bahnschrift SemiBold" panose="020B0502040204020203" pitchFamily="34" charset="0"/>
             </a:endParaRPr>
           </a:p>
@@ -3705,7 +3707,7 @@
         </p:spPr>
         <p:txBody>
           <a:bodyPr>
-            <a:normAutofit lnSpcReduction="10000"/>
+            <a:normAutofit/>
           </a:bodyPr>
           <a:lstStyle/>
           <a:p>
@@ -3714,7 +3716,7 @@
             </a:pPr>
             <a:r>
               <a:rPr lang="hu-HU" sz="3000" dirty="0" smtClean="0">
-                <a:latin typeface="Bahnschrift SemiBold" panose="020B0502040204020203" pitchFamily="34" charset="0"/>
+                <a:latin typeface="Bahnschrift SemiBold SemiConden" panose="020B0502040204020203" pitchFamily="34" charset="0"/>
               </a:rPr>
               <a:t>Lehetővé teszi: </a:t>
             </a:r>
@@ -3723,7 +3725,7 @@
             <a:pPr lvl="1"/>
             <a:r>
               <a:rPr lang="hu-HU" sz="3000" dirty="0" smtClean="0">
-                <a:latin typeface="Bahnschrift SemiBold" panose="020B0502040204020203" pitchFamily="34" charset="0"/>
+                <a:latin typeface="Bahnschrift SemiBold SemiConden" panose="020B0502040204020203" pitchFamily="34" charset="0"/>
               </a:rPr>
               <a:t>Dokumentáció</a:t>
             </a:r>
@@ -3732,7 +3734,7 @@
             <a:pPr lvl="1"/>
             <a:r>
               <a:rPr lang="hu-HU" sz="3000" dirty="0" smtClean="0">
-                <a:latin typeface="Bahnschrift SemiBold" panose="020B0502040204020203" pitchFamily="34" charset="0"/>
+                <a:latin typeface="Bahnschrift SemiBold SemiConden" panose="020B0502040204020203" pitchFamily="34" charset="0"/>
               </a:rPr>
               <a:t>Verzió/kiadáskövetés (címkékkel, mérföldkövekkel…)</a:t>
             </a:r>
@@ -3741,19 +3743,16 @@
             <a:pPr lvl="1"/>
             <a:r>
               <a:rPr lang="hu-HU" sz="3000" dirty="0" smtClean="0">
-                <a:latin typeface="Bahnschrift SemiBold" panose="020B0502040204020203" pitchFamily="34" charset="0"/>
+                <a:latin typeface="Bahnschrift SemiBold SemiConden" panose="020B0502040204020203" pitchFamily="34" charset="0"/>
               </a:rPr>
               <a:t>Feladatkezelés</a:t>
             </a:r>
-            <a:endParaRPr lang="hu-HU" sz="3000" dirty="0" smtClean="0">
-              <a:latin typeface="Bahnschrift SemiBold" panose="020B0502040204020203" pitchFamily="34" charset="0"/>
-            </a:endParaRPr>
           </a:p>
           <a:p>
             <a:pPr lvl="1"/>
             <a:r>
               <a:rPr lang="hu-HU" sz="3000" dirty="0" smtClean="0">
-                <a:latin typeface="Bahnschrift SemiBold" panose="020B0502040204020203" pitchFamily="34" charset="0"/>
+                <a:latin typeface="Bahnschrift SemiBold SemiConden" panose="020B0502040204020203" pitchFamily="34" charset="0"/>
               </a:rPr>
               <a:t>Csapatmunka közös projekteken (online)</a:t>
             </a:r>
@@ -3762,13 +3761,13 @@
             <a:pPr lvl="1"/>
             <a:r>
               <a:rPr lang="hu-HU" sz="3000" dirty="0" smtClean="0">
-                <a:latin typeface="Bahnschrift SemiBold" panose="020B0502040204020203" pitchFamily="34" charset="0"/>
+                <a:latin typeface="Bahnschrift SemiBold SemiConden" panose="020B0502040204020203" pitchFamily="34" charset="0"/>
               </a:rPr>
               <a:t>Bugkövetés (felmerülő hibák észlelése &amp; javítása</a:t>
             </a:r>
             <a:r>
               <a:rPr lang="hu-HU" sz="3000" dirty="0">
-                <a:latin typeface="Bahnschrift SemiBold" panose="020B0502040204020203" pitchFamily="34" charset="0"/>
+                <a:latin typeface="Bahnschrift SemiBold SemiConden" panose="020B0502040204020203" pitchFamily="34" charset="0"/>
               </a:rPr>
               <a:t>)</a:t>
             </a:r>
@@ -4302,69 +4301,97 @@
           <a:lstStyle/>
           <a:p>
             <a:r>
-              <a:rPr lang="hu-HU" dirty="0" smtClean="0"/>
+              <a:rPr lang="hu-HU" dirty="0" smtClean="0">
+                <a:latin typeface="Bahnschrift SemiBold SemiConden" panose="020B0502040204020203" pitchFamily="34" charset="0"/>
+              </a:rPr>
               <a:t>GitHub.inc létrejöttének éve: 2007 (San Francisco)</a:t>
             </a:r>
           </a:p>
           <a:p>
             <a:r>
-              <a:rPr lang="hu-HU" dirty="0" smtClean="0"/>
+              <a:rPr lang="hu-HU" dirty="0" smtClean="0">
+                <a:latin typeface="Bahnschrift SemiBold SemiConden" panose="020B0502040204020203" pitchFamily="34" charset="0"/>
+              </a:rPr>
               <a:t>A </a:t>
             </a:r>
             <a:r>
-              <a:rPr lang="hu-HU" dirty="0" err="1" smtClean="0"/>
+              <a:rPr lang="hu-HU" dirty="0" err="1" smtClean="0">
+                <a:latin typeface="Bahnschrift SemiBold SemiConden" panose="020B0502040204020203" pitchFamily="34" charset="0"/>
+              </a:rPr>
               <a:t>GitHub</a:t>
             </a:r>
             <a:r>
-              <a:rPr lang="hu-HU" dirty="0" smtClean="0"/>
+              <a:rPr lang="hu-HU" dirty="0" smtClean="0">
+                <a:latin typeface="Bahnschrift SemiBold SemiConden" panose="020B0502040204020203" pitchFamily="34" charset="0"/>
+              </a:rPr>
               <a:t> (felület) létrejötte: 2008 február</a:t>
             </a:r>
           </a:p>
           <a:p>
             <a:r>
-              <a:rPr lang="hu-HU" dirty="0" smtClean="0"/>
+              <a:rPr lang="hu-HU" dirty="0" smtClean="0">
+                <a:latin typeface="Bahnschrift SemiBold SemiConden" panose="020B0502040204020203" pitchFamily="34" charset="0"/>
+              </a:rPr>
               <a:t>Több milliós támogatásokat szerzett</a:t>
             </a:r>
           </a:p>
           <a:p>
             <a:r>
-              <a:rPr lang="hu-HU" dirty="0" smtClean="0"/>
+              <a:rPr lang="hu-HU" dirty="0" smtClean="0">
+                <a:latin typeface="Bahnschrift SemiBold SemiConden" panose="020B0502040204020203" pitchFamily="34" charset="0"/>
+              </a:rPr>
               <a:t>(</a:t>
             </a:r>
             <a:r>
-              <a:rPr lang="hu-HU" dirty="0" err="1" smtClean="0"/>
+              <a:rPr lang="hu-HU" dirty="0" err="1" smtClean="0">
+                <a:latin typeface="Bahnschrift SemiBold SemiConden" panose="020B0502040204020203" pitchFamily="34" charset="0"/>
+              </a:rPr>
               <a:t>Andreessen</a:t>
             </a:r>
             <a:r>
-              <a:rPr lang="hu-HU" dirty="0" smtClean="0"/>
+              <a:rPr lang="hu-HU" dirty="0" smtClean="0">
+                <a:latin typeface="Bahnschrift SemiBold SemiConden" panose="020B0502040204020203" pitchFamily="34" charset="0"/>
+              </a:rPr>
               <a:t> Horowitz, </a:t>
             </a:r>
             <a:r>
-              <a:rPr lang="hu-HU" dirty="0" err="1" smtClean="0"/>
+              <a:rPr lang="hu-HU" dirty="0" err="1" smtClean="0">
+                <a:latin typeface="Bahnschrift SemiBold SemiConden" panose="020B0502040204020203" pitchFamily="34" charset="0"/>
+              </a:rPr>
               <a:t>Sequoia</a:t>
             </a:r>
             <a:r>
-              <a:rPr lang="hu-HU" dirty="0" smtClean="0"/>
+              <a:rPr lang="hu-HU" dirty="0" smtClean="0">
+                <a:latin typeface="Bahnschrift SemiBold SemiConden" panose="020B0502040204020203" pitchFamily="34" charset="0"/>
+              </a:rPr>
               <a:t> Capital…)</a:t>
             </a:r>
           </a:p>
           <a:p>
             <a:r>
-              <a:rPr lang="hu-HU" dirty="0" smtClean="0"/>
+              <a:rPr lang="hu-HU" dirty="0" smtClean="0">
+                <a:latin typeface="Bahnschrift SemiBold SemiConden" panose="020B0502040204020203" pitchFamily="34" charset="0"/>
+              </a:rPr>
               <a:t>Aktív felhasználók (2015): 3 millió</a:t>
             </a:r>
           </a:p>
           <a:p>
             <a:r>
-              <a:rPr lang="hu-HU" dirty="0" smtClean="0"/>
+              <a:rPr lang="hu-HU" dirty="0" smtClean="0">
+                <a:latin typeface="Bahnschrift SemiBold SemiConden" panose="020B0502040204020203" pitchFamily="34" charset="0"/>
+              </a:rPr>
               <a:t>2018: elszenvedte a 2. legnagyobb </a:t>
             </a:r>
             <a:r>
-              <a:rPr lang="hu-HU" dirty="0" err="1" smtClean="0"/>
+              <a:rPr lang="hu-HU" dirty="0" err="1" smtClean="0">
+                <a:latin typeface="Bahnschrift SemiBold SemiConden" panose="020B0502040204020203" pitchFamily="34" charset="0"/>
+              </a:rPr>
               <a:t>DDoS</a:t>
             </a:r>
             <a:r>
-              <a:rPr lang="hu-HU" dirty="0" smtClean="0"/>
+              <a:rPr lang="hu-HU" dirty="0" smtClean="0">
+                <a:latin typeface="Bahnschrift SemiBold SemiConden" panose="020B0502040204020203" pitchFamily="34" charset="0"/>
+              </a:rPr>
               <a:t> támadást (valaha)</a:t>
             </a:r>
           </a:p>
@@ -4383,9 +4410,364 @@
   <p:timing>
     <p:tnLst>
       <p:par>
-        <p:cTn id="1" dur="indefinite" restart="never" nodeType="tmRoot"/>
+        <p:cTn id="1" dur="indefinite" restart="never" nodeType="tmRoot">
+          <p:childTnLst>
+            <p:seq concurrent="1" nextAc="seek">
+              <p:cTn id="2" dur="indefinite" nodeType="mainSeq">
+                <p:childTnLst>
+                  <p:par>
+                    <p:cTn id="3" fill="hold">
+                      <p:stCondLst>
+                        <p:cond delay="indefinite"/>
+                      </p:stCondLst>
+                      <p:childTnLst>
+                        <p:par>
+                          <p:cTn id="4" fill="hold">
+                            <p:stCondLst>
+                              <p:cond delay="0"/>
+                            </p:stCondLst>
+                            <p:childTnLst>
+                              <p:par>
+                                <p:cTn id="5" presetID="10" presetClass="entr" presetSubtype="0" fill="hold" grpId="0" nodeType="clickEffect">
+                                  <p:stCondLst>
+                                    <p:cond delay="0"/>
+                                  </p:stCondLst>
+                                  <p:childTnLst>
+                                    <p:set>
+                                      <p:cBhvr>
+                                        <p:cTn id="6" dur="1" fill="hold">
+                                          <p:stCondLst>
+                                            <p:cond delay="0"/>
+                                          </p:stCondLst>
+                                        </p:cTn>
+                                        <p:tgtEl>
+                                          <p:spTgt spid="2"/>
+                                        </p:tgtEl>
+                                        <p:attrNameLst>
+                                          <p:attrName>style.visibility</p:attrName>
+                                        </p:attrNameLst>
+                                      </p:cBhvr>
+                                      <p:to>
+                                        <p:strVal val="visible"/>
+                                      </p:to>
+                                    </p:set>
+                                    <p:animEffect transition="in" filter="fade">
+                                      <p:cBhvr>
+                                        <p:cTn id="7" dur="500"/>
+                                        <p:tgtEl>
+                                          <p:spTgt spid="2"/>
+                                        </p:tgtEl>
+                                      </p:cBhvr>
+                                    </p:animEffect>
+                                  </p:childTnLst>
+                                </p:cTn>
+                              </p:par>
+                            </p:childTnLst>
+                          </p:cTn>
+                        </p:par>
+                      </p:childTnLst>
+                    </p:cTn>
+                  </p:par>
+                  <p:par>
+                    <p:cTn id="8" fill="hold">
+                      <p:stCondLst>
+                        <p:cond delay="indefinite"/>
+                      </p:stCondLst>
+                      <p:childTnLst>
+                        <p:par>
+                          <p:cTn id="9" fill="hold">
+                            <p:stCondLst>
+                              <p:cond delay="0"/>
+                            </p:stCondLst>
+                            <p:childTnLst>
+                              <p:par>
+                                <p:cTn id="10" presetID="10" presetClass="entr" presetSubtype="0" fill="hold" nodeType="clickEffect">
+                                  <p:stCondLst>
+                                    <p:cond delay="0"/>
+                                  </p:stCondLst>
+                                  <p:childTnLst>
+                                    <p:set>
+                                      <p:cBhvr>
+                                        <p:cTn id="11" dur="1" fill="hold">
+                                          <p:stCondLst>
+                                            <p:cond delay="0"/>
+                                          </p:stCondLst>
+                                        </p:cTn>
+                                        <p:tgtEl>
+                                          <p:spTgt spid="3">
+                                            <p:txEl>
+                                              <p:pRg st="0" end="0"/>
+                                            </p:txEl>
+                                          </p:spTgt>
+                                        </p:tgtEl>
+                                        <p:attrNameLst>
+                                          <p:attrName>style.visibility</p:attrName>
+                                        </p:attrNameLst>
+                                      </p:cBhvr>
+                                      <p:to>
+                                        <p:strVal val="visible"/>
+                                      </p:to>
+                                    </p:set>
+                                    <p:animEffect transition="in" filter="fade">
+                                      <p:cBhvr>
+                                        <p:cTn id="12" dur="500"/>
+                                        <p:tgtEl>
+                                          <p:spTgt spid="3">
+                                            <p:txEl>
+                                              <p:pRg st="0" end="0"/>
+                                            </p:txEl>
+                                          </p:spTgt>
+                                        </p:tgtEl>
+                                      </p:cBhvr>
+                                    </p:animEffect>
+                                  </p:childTnLst>
+                                </p:cTn>
+                              </p:par>
+                              <p:par>
+                                <p:cTn id="13" presetID="10" presetClass="entr" presetSubtype="0" fill="hold" nodeType="withEffect">
+                                  <p:stCondLst>
+                                    <p:cond delay="0"/>
+                                  </p:stCondLst>
+                                  <p:childTnLst>
+                                    <p:set>
+                                      <p:cBhvr>
+                                        <p:cTn id="14" dur="1" fill="hold">
+                                          <p:stCondLst>
+                                            <p:cond delay="0"/>
+                                          </p:stCondLst>
+                                        </p:cTn>
+                                        <p:tgtEl>
+                                          <p:spTgt spid="3">
+                                            <p:txEl>
+                                              <p:pRg st="1" end="1"/>
+                                            </p:txEl>
+                                          </p:spTgt>
+                                        </p:tgtEl>
+                                        <p:attrNameLst>
+                                          <p:attrName>style.visibility</p:attrName>
+                                        </p:attrNameLst>
+                                      </p:cBhvr>
+                                      <p:to>
+                                        <p:strVal val="visible"/>
+                                      </p:to>
+                                    </p:set>
+                                    <p:animEffect transition="in" filter="fade">
+                                      <p:cBhvr>
+                                        <p:cTn id="15" dur="500"/>
+                                        <p:tgtEl>
+                                          <p:spTgt spid="3">
+                                            <p:txEl>
+                                              <p:pRg st="1" end="1"/>
+                                            </p:txEl>
+                                          </p:spTgt>
+                                        </p:tgtEl>
+                                      </p:cBhvr>
+                                    </p:animEffect>
+                                  </p:childTnLst>
+                                </p:cTn>
+                              </p:par>
+                              <p:par>
+                                <p:cTn id="16" presetID="10" presetClass="entr" presetSubtype="0" fill="hold" nodeType="withEffect">
+                                  <p:stCondLst>
+                                    <p:cond delay="0"/>
+                                  </p:stCondLst>
+                                  <p:childTnLst>
+                                    <p:set>
+                                      <p:cBhvr>
+                                        <p:cTn id="17" dur="1" fill="hold">
+                                          <p:stCondLst>
+                                            <p:cond delay="0"/>
+                                          </p:stCondLst>
+                                        </p:cTn>
+                                        <p:tgtEl>
+                                          <p:spTgt spid="3">
+                                            <p:txEl>
+                                              <p:pRg st="2" end="2"/>
+                                            </p:txEl>
+                                          </p:spTgt>
+                                        </p:tgtEl>
+                                        <p:attrNameLst>
+                                          <p:attrName>style.visibility</p:attrName>
+                                        </p:attrNameLst>
+                                      </p:cBhvr>
+                                      <p:to>
+                                        <p:strVal val="visible"/>
+                                      </p:to>
+                                    </p:set>
+                                    <p:animEffect transition="in" filter="fade">
+                                      <p:cBhvr>
+                                        <p:cTn id="18" dur="500"/>
+                                        <p:tgtEl>
+                                          <p:spTgt spid="3">
+                                            <p:txEl>
+                                              <p:pRg st="2" end="2"/>
+                                            </p:txEl>
+                                          </p:spTgt>
+                                        </p:tgtEl>
+                                      </p:cBhvr>
+                                    </p:animEffect>
+                                  </p:childTnLst>
+                                </p:cTn>
+                              </p:par>
+                              <p:par>
+                                <p:cTn id="19" presetID="10" presetClass="entr" presetSubtype="0" fill="hold" nodeType="withEffect">
+                                  <p:stCondLst>
+                                    <p:cond delay="0"/>
+                                  </p:stCondLst>
+                                  <p:childTnLst>
+                                    <p:set>
+                                      <p:cBhvr>
+                                        <p:cTn id="20" dur="1" fill="hold">
+                                          <p:stCondLst>
+                                            <p:cond delay="0"/>
+                                          </p:stCondLst>
+                                        </p:cTn>
+                                        <p:tgtEl>
+                                          <p:spTgt spid="3">
+                                            <p:txEl>
+                                              <p:pRg st="3" end="3"/>
+                                            </p:txEl>
+                                          </p:spTgt>
+                                        </p:tgtEl>
+                                        <p:attrNameLst>
+                                          <p:attrName>style.visibility</p:attrName>
+                                        </p:attrNameLst>
+                                      </p:cBhvr>
+                                      <p:to>
+                                        <p:strVal val="visible"/>
+                                      </p:to>
+                                    </p:set>
+                                    <p:animEffect transition="in" filter="fade">
+                                      <p:cBhvr>
+                                        <p:cTn id="21" dur="500"/>
+                                        <p:tgtEl>
+                                          <p:spTgt spid="3">
+                                            <p:txEl>
+                                              <p:pRg st="3" end="3"/>
+                                            </p:txEl>
+                                          </p:spTgt>
+                                        </p:tgtEl>
+                                      </p:cBhvr>
+                                    </p:animEffect>
+                                  </p:childTnLst>
+                                </p:cTn>
+                              </p:par>
+                              <p:par>
+                                <p:cTn id="22" presetID="10" presetClass="entr" presetSubtype="0" fill="hold" nodeType="withEffect">
+                                  <p:stCondLst>
+                                    <p:cond delay="0"/>
+                                  </p:stCondLst>
+                                  <p:childTnLst>
+                                    <p:set>
+                                      <p:cBhvr>
+                                        <p:cTn id="23" dur="1" fill="hold">
+                                          <p:stCondLst>
+                                            <p:cond delay="0"/>
+                                          </p:stCondLst>
+                                        </p:cTn>
+                                        <p:tgtEl>
+                                          <p:spTgt spid="3">
+                                            <p:txEl>
+                                              <p:pRg st="4" end="4"/>
+                                            </p:txEl>
+                                          </p:spTgt>
+                                        </p:tgtEl>
+                                        <p:attrNameLst>
+                                          <p:attrName>style.visibility</p:attrName>
+                                        </p:attrNameLst>
+                                      </p:cBhvr>
+                                      <p:to>
+                                        <p:strVal val="visible"/>
+                                      </p:to>
+                                    </p:set>
+                                    <p:animEffect transition="in" filter="fade">
+                                      <p:cBhvr>
+                                        <p:cTn id="24" dur="500"/>
+                                        <p:tgtEl>
+                                          <p:spTgt spid="3">
+                                            <p:txEl>
+                                              <p:pRg st="4" end="4"/>
+                                            </p:txEl>
+                                          </p:spTgt>
+                                        </p:tgtEl>
+                                      </p:cBhvr>
+                                    </p:animEffect>
+                                  </p:childTnLst>
+                                </p:cTn>
+                              </p:par>
+                              <p:par>
+                                <p:cTn id="25" presetID="10" presetClass="entr" presetSubtype="0" fill="hold" nodeType="withEffect">
+                                  <p:stCondLst>
+                                    <p:cond delay="0"/>
+                                  </p:stCondLst>
+                                  <p:childTnLst>
+                                    <p:set>
+                                      <p:cBhvr>
+                                        <p:cTn id="26" dur="1" fill="hold">
+                                          <p:stCondLst>
+                                            <p:cond delay="0"/>
+                                          </p:stCondLst>
+                                        </p:cTn>
+                                        <p:tgtEl>
+                                          <p:spTgt spid="3">
+                                            <p:txEl>
+                                              <p:pRg st="5" end="5"/>
+                                            </p:txEl>
+                                          </p:spTgt>
+                                        </p:tgtEl>
+                                        <p:attrNameLst>
+                                          <p:attrName>style.visibility</p:attrName>
+                                        </p:attrNameLst>
+                                      </p:cBhvr>
+                                      <p:to>
+                                        <p:strVal val="visible"/>
+                                      </p:to>
+                                    </p:set>
+                                    <p:animEffect transition="in" filter="fade">
+                                      <p:cBhvr>
+                                        <p:cTn id="27" dur="500"/>
+                                        <p:tgtEl>
+                                          <p:spTgt spid="3">
+                                            <p:txEl>
+                                              <p:pRg st="5" end="5"/>
+                                            </p:txEl>
+                                          </p:spTgt>
+                                        </p:tgtEl>
+                                      </p:cBhvr>
+                                    </p:animEffect>
+                                  </p:childTnLst>
+                                </p:cTn>
+                              </p:par>
+                            </p:childTnLst>
+                          </p:cTn>
+                        </p:par>
+                      </p:childTnLst>
+                    </p:cTn>
+                  </p:par>
+                </p:childTnLst>
+              </p:cTn>
+              <p:prevCondLst>
+                <p:cond evt="onPrev" delay="0">
+                  <p:tgtEl>
+                    <p:sldTgt/>
+                  </p:tgtEl>
+                </p:cond>
+              </p:prevCondLst>
+              <p:nextCondLst>
+                <p:cond evt="onNext" delay="0">
+                  <p:tgtEl>
+                    <p:sldTgt/>
+                  </p:tgtEl>
+                </p:cond>
+              </p:nextCondLst>
+            </p:seq>
+          </p:childTnLst>
+        </p:cTn>
       </p:par>
     </p:tnLst>
+    <p:bldLst>
+      <p:bldP spid="2" grpId="0"/>
+    </p:bldLst>
   </p:timing>
 </p:sld>
 </file>
@@ -4460,34 +4842,46 @@
           <a:lstStyle/>
           <a:p>
             <a:r>
-              <a:rPr lang="hu-HU" dirty="0" smtClean="0"/>
+              <a:rPr lang="hu-HU" dirty="0" smtClean="0">
+                <a:latin typeface="Bahnschrift SemiBold SemiConden" panose="020B0502040204020203" pitchFamily="34" charset="0"/>
+              </a:rPr>
               <a:t>2018 június 4.: A Microsoft benyújtja igényét</a:t>
             </a:r>
           </a:p>
           <a:p>
             <a:r>
-              <a:rPr lang="hu-HU" dirty="0" smtClean="0"/>
+              <a:rPr lang="hu-HU" dirty="0" smtClean="0">
+                <a:latin typeface="Bahnschrift SemiBold SemiConden" panose="020B0502040204020203" pitchFamily="34" charset="0"/>
+              </a:rPr>
               <a:t>A felajánlott összeg 7,5 millió dollár</a:t>
             </a:r>
           </a:p>
           <a:p>
             <a:r>
-              <a:rPr lang="hu-HU" dirty="0" smtClean="0"/>
+              <a:rPr lang="hu-HU" dirty="0" smtClean="0">
+                <a:latin typeface="Bahnschrift SemiBold SemiConden" panose="020B0502040204020203" pitchFamily="34" charset="0"/>
+              </a:rPr>
               <a:t>(2018)június 4.-október 26.:Tárgyalások, az üzlet megköttetése</a:t>
             </a:r>
           </a:p>
           <a:p>
             <a:r>
-              <a:rPr lang="hu-HU" dirty="0" smtClean="0"/>
+              <a:rPr lang="hu-HU" dirty="0" smtClean="0">
+                <a:latin typeface="Bahnschrift SemiBold SemiConden" panose="020B0502040204020203" pitchFamily="34" charset="0"/>
+              </a:rPr>
               <a:t>2018 október 26.: Lezárulnak a tárgyalások, az üzlet maga is</a:t>
             </a:r>
           </a:p>
           <a:p>
             <a:r>
-              <a:rPr lang="hu-HU" dirty="0" smtClean="0"/>
+              <a:rPr lang="hu-HU" dirty="0" smtClean="0">
+                <a:latin typeface="Bahnschrift SemiBold SemiConden" panose="020B0502040204020203" pitchFamily="34" charset="0"/>
+              </a:rPr>
               <a:t>A platform önálló maradt, mint közösség, és szolgáltatás</a:t>
             </a:r>
-            <a:endParaRPr lang="hu-HU" dirty="0"/>
+            <a:endParaRPr lang="hu-HU" dirty="0">
+              <a:latin typeface="Bahnschrift SemiBold SemiConden" panose="020B0502040204020203" pitchFamily="34" charset="0"/>
+            </a:endParaRPr>
           </a:p>
         </p:txBody>
       </p:sp>
@@ -4531,11 +4925,11 @@
   <p:clrMapOvr>
     <a:masterClrMapping/>
   </p:clrMapOvr>
-  <mc:AlternateContent xmlns:mc="http://schemas.openxmlformats.org/markup-compatibility/2006">
-    <mc:Choice xmlns:p14="http://schemas.microsoft.com/office/powerpoint/2010/main" Requires="p14">
+  <mc:AlternateContent xmlns:mc="http://schemas.openxmlformats.org/markup-compatibility/2006" xmlns:p14="http://schemas.microsoft.com/office/powerpoint/2010/main">
+    <mc:Choice Requires="p14">
       <p:transition p14:dur="0"/>
     </mc:Choice>
-    <mc:Fallback>
+    <mc:Fallback xmlns="">
       <p:transition/>
     </mc:Fallback>
   </mc:AlternateContent>
@@ -4984,69 +5378,99 @@
           <a:lstStyle/>
           <a:p>
             <a:r>
-              <a:rPr lang="hu-HU" dirty="0" smtClean="0"/>
+              <a:rPr lang="hu-HU" dirty="0" smtClean="0">
+                <a:latin typeface="Bahnschrift SemiBold SemiConden" panose="020B0502040204020203" pitchFamily="34" charset="0"/>
+              </a:rPr>
               <a:t>A Microsoft a program aktív felhasználója lett</a:t>
             </a:r>
           </a:p>
           <a:p>
             <a:r>
-              <a:rPr lang="hu-HU" dirty="0" smtClean="0"/>
+              <a:rPr lang="hu-HU" dirty="0" smtClean="0">
+                <a:latin typeface="Bahnschrift SemiBold SemiConden" panose="020B0502040204020203" pitchFamily="34" charset="0"/>
+              </a:rPr>
               <a:t>A vásárlás oka: több felhasználó elérése (=üzleti stratégia)</a:t>
             </a:r>
           </a:p>
           <a:p>
             <a:r>
-              <a:rPr lang="hu-HU" dirty="0" smtClean="0"/>
+              <a:rPr lang="hu-HU" dirty="0" smtClean="0">
+                <a:latin typeface="Bahnschrift SemiBold SemiConden" panose="020B0502040204020203" pitchFamily="34" charset="0"/>
+              </a:rPr>
               <a:t>Az aggályok növelték a konkurens cégek számait</a:t>
             </a:r>
           </a:p>
           <a:p>
             <a:r>
-              <a:rPr lang="hu-HU" dirty="0" smtClean="0"/>
+              <a:rPr lang="hu-HU" dirty="0" smtClean="0">
+                <a:latin typeface="Bahnschrift SemiBold SemiConden" panose="020B0502040204020203" pitchFamily="34" charset="0"/>
+              </a:rPr>
               <a:t>(</a:t>
             </a:r>
             <a:r>
-              <a:rPr lang="hu-HU" dirty="0" err="1" smtClean="0"/>
+              <a:rPr lang="hu-HU" dirty="0" err="1" smtClean="0">
+                <a:latin typeface="Bahnschrift SemiBold SemiConden" panose="020B0502040204020203" pitchFamily="34" charset="0"/>
+              </a:rPr>
               <a:t>GitLab</a:t>
             </a:r>
             <a:r>
-              <a:rPr lang="hu-HU" dirty="0" smtClean="0"/>
+              <a:rPr lang="hu-HU" dirty="0" smtClean="0">
+                <a:latin typeface="Bahnschrift SemiBold SemiConden" panose="020B0502040204020203" pitchFamily="34" charset="0"/>
+              </a:rPr>
               <a:t>, </a:t>
             </a:r>
             <a:r>
-              <a:rPr lang="hu-HU" dirty="0" err="1" smtClean="0"/>
+              <a:rPr lang="hu-HU" dirty="0" err="1" smtClean="0">
+                <a:latin typeface="Bahnschrift SemiBold SemiConden" panose="020B0502040204020203" pitchFamily="34" charset="0"/>
+              </a:rPr>
               <a:t>Bitbucket</a:t>
             </a:r>
             <a:r>
-              <a:rPr lang="hu-HU" dirty="0" smtClean="0"/>
+              <a:rPr lang="hu-HU" dirty="0" smtClean="0">
+                <a:latin typeface="Bahnschrift SemiBold SemiConden" panose="020B0502040204020203" pitchFamily="34" charset="0"/>
+              </a:rPr>
               <a:t>…)</a:t>
             </a:r>
           </a:p>
           <a:p>
             <a:r>
-              <a:rPr lang="hu-HU" dirty="0" smtClean="0"/>
+              <a:rPr lang="hu-HU" dirty="0" smtClean="0">
+                <a:latin typeface="Bahnschrift SemiBold SemiConden" panose="020B0502040204020203" pitchFamily="34" charset="0"/>
+              </a:rPr>
               <a:t>A </a:t>
             </a:r>
             <a:r>
-              <a:rPr lang="hu-HU" dirty="0" err="1" smtClean="0"/>
+              <a:rPr lang="hu-HU" dirty="0" err="1" smtClean="0">
+                <a:latin typeface="Bahnschrift SemiBold SemiConden" panose="020B0502040204020203" pitchFamily="34" charset="0"/>
+              </a:rPr>
               <a:t>GitHubot</a:t>
             </a:r>
             <a:r>
-              <a:rPr lang="hu-HU" dirty="0" smtClean="0"/>
+              <a:rPr lang="hu-HU" dirty="0" smtClean="0">
+                <a:latin typeface="Bahnschrift SemiBold SemiConden" panose="020B0502040204020203" pitchFamily="34" charset="0"/>
+              </a:rPr>
               <a:t> elkezdte támogatni A VS </a:t>
             </a:r>
             <a:r>
-              <a:rPr lang="hu-HU" dirty="0" err="1" smtClean="0"/>
+              <a:rPr lang="hu-HU" dirty="0" err="1" smtClean="0">
+                <a:latin typeface="Bahnschrift SemiBold SemiConden" panose="020B0502040204020203" pitchFamily="34" charset="0"/>
+              </a:rPr>
               <a:t>Code</a:t>
             </a:r>
-            <a:endParaRPr lang="hu-HU" dirty="0" smtClean="0"/>
-          </a:p>
-          <a:p>
-            <a:r>
-              <a:rPr lang="hu-HU" dirty="0" smtClean="0"/>
+            <a:endParaRPr lang="hu-HU" dirty="0" smtClean="0">
+              <a:latin typeface="Bahnschrift SemiBold SemiConden" panose="020B0502040204020203" pitchFamily="34" charset="0"/>
+            </a:endParaRPr>
+          </a:p>
+          <a:p>
+            <a:r>
+              <a:rPr lang="hu-HU" dirty="0" smtClean="0">
+                <a:latin typeface="Bahnschrift SemiBold SemiConden" panose="020B0502040204020203" pitchFamily="34" charset="0"/>
+              </a:rPr>
               <a:t>(sok más program is)</a:t>
             </a:r>
-            <a:endParaRPr lang="hu-HU" dirty="0"/>
+            <a:endParaRPr lang="hu-HU" dirty="0">
+              <a:latin typeface="Bahnschrift SemiBold SemiConden" panose="020B0502040204020203" pitchFamily="34" charset="0"/>
+            </a:endParaRPr>
           </a:p>
         </p:txBody>
       </p:sp>
@@ -5109,6 +5533,282 @@
                                         <p:cTn id="7" dur="500"/>
                                         <p:tgtEl>
                                           <p:spTgt spid="2"/>
+                                        </p:tgtEl>
+                                      </p:cBhvr>
+                                    </p:animEffect>
+                                  </p:childTnLst>
+                                </p:cTn>
+                              </p:par>
+                            </p:childTnLst>
+                          </p:cTn>
+                        </p:par>
+                      </p:childTnLst>
+                    </p:cTn>
+                  </p:par>
+                  <p:par>
+                    <p:cTn id="8" fill="hold">
+                      <p:stCondLst>
+                        <p:cond delay="indefinite"/>
+                      </p:stCondLst>
+                      <p:childTnLst>
+                        <p:par>
+                          <p:cTn id="9" fill="hold">
+                            <p:stCondLst>
+                              <p:cond delay="0"/>
+                            </p:stCondLst>
+                            <p:childTnLst>
+                              <p:par>
+                                <p:cTn id="10" presetID="10" presetClass="entr" presetSubtype="0" fill="hold" nodeType="clickEffect">
+                                  <p:stCondLst>
+                                    <p:cond delay="0"/>
+                                  </p:stCondLst>
+                                  <p:childTnLst>
+                                    <p:set>
+                                      <p:cBhvr>
+                                        <p:cTn id="11" dur="1" fill="hold">
+                                          <p:stCondLst>
+                                            <p:cond delay="0"/>
+                                          </p:stCondLst>
+                                        </p:cTn>
+                                        <p:tgtEl>
+                                          <p:spTgt spid="3">
+                                            <p:txEl>
+                                              <p:pRg st="0" end="0"/>
+                                            </p:txEl>
+                                          </p:spTgt>
+                                        </p:tgtEl>
+                                        <p:attrNameLst>
+                                          <p:attrName>style.visibility</p:attrName>
+                                        </p:attrNameLst>
+                                      </p:cBhvr>
+                                      <p:to>
+                                        <p:strVal val="visible"/>
+                                      </p:to>
+                                    </p:set>
+                                    <p:animEffect transition="in" filter="fade">
+                                      <p:cBhvr>
+                                        <p:cTn id="12" dur="500"/>
+                                        <p:tgtEl>
+                                          <p:spTgt spid="3">
+                                            <p:txEl>
+                                              <p:pRg st="0" end="0"/>
+                                            </p:txEl>
+                                          </p:spTgt>
+                                        </p:tgtEl>
+                                      </p:cBhvr>
+                                    </p:animEffect>
+                                  </p:childTnLst>
+                                </p:cTn>
+                              </p:par>
+                              <p:par>
+                                <p:cTn id="13" presetID="10" presetClass="entr" presetSubtype="0" fill="hold" nodeType="withEffect">
+                                  <p:stCondLst>
+                                    <p:cond delay="0"/>
+                                  </p:stCondLst>
+                                  <p:childTnLst>
+                                    <p:set>
+                                      <p:cBhvr>
+                                        <p:cTn id="14" dur="1" fill="hold">
+                                          <p:stCondLst>
+                                            <p:cond delay="0"/>
+                                          </p:stCondLst>
+                                        </p:cTn>
+                                        <p:tgtEl>
+                                          <p:spTgt spid="3">
+                                            <p:txEl>
+                                              <p:pRg st="1" end="1"/>
+                                            </p:txEl>
+                                          </p:spTgt>
+                                        </p:tgtEl>
+                                        <p:attrNameLst>
+                                          <p:attrName>style.visibility</p:attrName>
+                                        </p:attrNameLst>
+                                      </p:cBhvr>
+                                      <p:to>
+                                        <p:strVal val="visible"/>
+                                      </p:to>
+                                    </p:set>
+                                    <p:animEffect transition="in" filter="fade">
+                                      <p:cBhvr>
+                                        <p:cTn id="15" dur="500"/>
+                                        <p:tgtEl>
+                                          <p:spTgt spid="3">
+                                            <p:txEl>
+                                              <p:pRg st="1" end="1"/>
+                                            </p:txEl>
+                                          </p:spTgt>
+                                        </p:tgtEl>
+                                      </p:cBhvr>
+                                    </p:animEffect>
+                                  </p:childTnLst>
+                                </p:cTn>
+                              </p:par>
+                              <p:par>
+                                <p:cTn id="16" presetID="10" presetClass="entr" presetSubtype="0" fill="hold" nodeType="withEffect">
+                                  <p:stCondLst>
+                                    <p:cond delay="0"/>
+                                  </p:stCondLst>
+                                  <p:childTnLst>
+                                    <p:set>
+                                      <p:cBhvr>
+                                        <p:cTn id="17" dur="1" fill="hold">
+                                          <p:stCondLst>
+                                            <p:cond delay="0"/>
+                                          </p:stCondLst>
+                                        </p:cTn>
+                                        <p:tgtEl>
+                                          <p:spTgt spid="3">
+                                            <p:txEl>
+                                              <p:pRg st="2" end="2"/>
+                                            </p:txEl>
+                                          </p:spTgt>
+                                        </p:tgtEl>
+                                        <p:attrNameLst>
+                                          <p:attrName>style.visibility</p:attrName>
+                                        </p:attrNameLst>
+                                      </p:cBhvr>
+                                      <p:to>
+                                        <p:strVal val="visible"/>
+                                      </p:to>
+                                    </p:set>
+                                    <p:animEffect transition="in" filter="fade">
+                                      <p:cBhvr>
+                                        <p:cTn id="18" dur="500"/>
+                                        <p:tgtEl>
+                                          <p:spTgt spid="3">
+                                            <p:txEl>
+                                              <p:pRg st="2" end="2"/>
+                                            </p:txEl>
+                                          </p:spTgt>
+                                        </p:tgtEl>
+                                      </p:cBhvr>
+                                    </p:animEffect>
+                                  </p:childTnLst>
+                                </p:cTn>
+                              </p:par>
+                              <p:par>
+                                <p:cTn id="19" presetID="10" presetClass="entr" presetSubtype="0" fill="hold" nodeType="withEffect">
+                                  <p:stCondLst>
+                                    <p:cond delay="0"/>
+                                  </p:stCondLst>
+                                  <p:childTnLst>
+                                    <p:set>
+                                      <p:cBhvr>
+                                        <p:cTn id="20" dur="1" fill="hold">
+                                          <p:stCondLst>
+                                            <p:cond delay="0"/>
+                                          </p:stCondLst>
+                                        </p:cTn>
+                                        <p:tgtEl>
+                                          <p:spTgt spid="3">
+                                            <p:txEl>
+                                              <p:pRg st="3" end="3"/>
+                                            </p:txEl>
+                                          </p:spTgt>
+                                        </p:tgtEl>
+                                        <p:attrNameLst>
+                                          <p:attrName>style.visibility</p:attrName>
+                                        </p:attrNameLst>
+                                      </p:cBhvr>
+                                      <p:to>
+                                        <p:strVal val="visible"/>
+                                      </p:to>
+                                    </p:set>
+                                    <p:animEffect transition="in" filter="fade">
+                                      <p:cBhvr>
+                                        <p:cTn id="21" dur="500"/>
+                                        <p:tgtEl>
+                                          <p:spTgt spid="3">
+                                            <p:txEl>
+                                              <p:pRg st="3" end="3"/>
+                                            </p:txEl>
+                                          </p:spTgt>
+                                        </p:tgtEl>
+                                      </p:cBhvr>
+                                    </p:animEffect>
+                                  </p:childTnLst>
+                                </p:cTn>
+                              </p:par>
+                              <p:par>
+                                <p:cTn id="22" presetID="10" presetClass="entr" presetSubtype="0" fill="hold" nodeType="withEffect">
+                                  <p:stCondLst>
+                                    <p:cond delay="0"/>
+                                  </p:stCondLst>
+                                  <p:childTnLst>
+                                    <p:set>
+                                      <p:cBhvr>
+                                        <p:cTn id="23" dur="1" fill="hold">
+                                          <p:stCondLst>
+                                            <p:cond delay="0"/>
+                                          </p:stCondLst>
+                                        </p:cTn>
+                                        <p:tgtEl>
+                                          <p:spTgt spid="3">
+                                            <p:txEl>
+                                              <p:pRg st="4" end="4"/>
+                                            </p:txEl>
+                                          </p:spTgt>
+                                        </p:tgtEl>
+                                        <p:attrNameLst>
+                                          <p:attrName>style.visibility</p:attrName>
+                                        </p:attrNameLst>
+                                      </p:cBhvr>
+                                      <p:to>
+                                        <p:strVal val="visible"/>
+                                      </p:to>
+                                    </p:set>
+                                    <p:animEffect transition="in" filter="fade">
+                                      <p:cBhvr>
+                                        <p:cTn id="24" dur="500"/>
+                                        <p:tgtEl>
+                                          <p:spTgt spid="3">
+                                            <p:txEl>
+                                              <p:pRg st="4" end="4"/>
+                                            </p:txEl>
+                                          </p:spTgt>
+                                        </p:tgtEl>
+                                      </p:cBhvr>
+                                    </p:animEffect>
+                                  </p:childTnLst>
+                                </p:cTn>
+                              </p:par>
+                              <p:par>
+                                <p:cTn id="25" presetID="10" presetClass="entr" presetSubtype="0" fill="hold" nodeType="withEffect">
+                                  <p:stCondLst>
+                                    <p:cond delay="0"/>
+                                  </p:stCondLst>
+                                  <p:childTnLst>
+                                    <p:set>
+                                      <p:cBhvr>
+                                        <p:cTn id="26" dur="1" fill="hold">
+                                          <p:stCondLst>
+                                            <p:cond delay="0"/>
+                                          </p:stCondLst>
+                                        </p:cTn>
+                                        <p:tgtEl>
+                                          <p:spTgt spid="3">
+                                            <p:txEl>
+                                              <p:pRg st="5" end="5"/>
+                                            </p:txEl>
+                                          </p:spTgt>
+                                        </p:tgtEl>
+                                        <p:attrNameLst>
+                                          <p:attrName>style.visibility</p:attrName>
+                                        </p:attrNameLst>
+                                      </p:cBhvr>
+                                      <p:to>
+                                        <p:strVal val="visible"/>
+                                      </p:to>
+                                    </p:set>
+                                    <p:animEffect transition="in" filter="fade">
+                                      <p:cBhvr>
+                                        <p:cTn id="27" dur="500"/>
+                                        <p:tgtEl>
+                                          <p:spTgt spid="3">
+                                            <p:txEl>
+                                              <p:pRg st="5" end="5"/>
+                                            </p:txEl>
+                                          </p:spTgt>
                                         </p:tgtEl>
                                       </p:cBhvr>
                                     </p:animEffect>
@@ -5176,7 +5876,12 @@
             <p:ph type="title"/>
           </p:nvPr>
         </p:nvSpPr>
-        <p:spPr/>
+        <p:spPr>
+          <a:xfrm>
+            <a:off x="838199" y="257549"/>
+            <a:ext cx="10515600" cy="1325563"/>
+          </a:xfrm>
+        </p:spPr>
         <p:txBody>
           <a:bodyPr>
             <a:normAutofit/>
@@ -5196,6 +5901,36 @@
           </a:p>
         </p:txBody>
       </p:sp>
+      <p:pic>
+        <p:nvPicPr>
+          <p:cNvPr id="4" name="Kép 3"/>
+          <p:cNvPicPr>
+            <a:picLocks noChangeAspect="1"/>
+          </p:cNvPicPr>
+          <p:nvPr/>
+        </p:nvPicPr>
+        <p:blipFill>
+          <a:blip r:embed="rId2" cstate="print">
+            <a:extLst>
+              <a:ext uri="{28A0092B-C50C-407E-A947-70E740481C1C}">
+                <a14:useLocalDpi xmlns:a14="http://schemas.microsoft.com/office/drawing/2010/main" val="0"/>
+              </a:ext>
+            </a:extLst>
+          </a:blip>
+          <a:stretch>
+            <a:fillRect/>
+          </a:stretch>
+        </p:blipFill>
+        <p:spPr>
+          <a:xfrm>
+            <a:off x="3637877" y="3978698"/>
+            <a:ext cx="4916243" cy="2492093"/>
+          </a:xfrm>
+          <a:prstGeom prst="rect">
+            <a:avLst/>
+          </a:prstGeom>
+        </p:spPr>
+      </p:pic>
       <p:sp>
         <p:nvSpPr>
           <p:cNvPr id="3" name="Tartalom helye 2"/>
@@ -5206,10 +5941,98 @@
             <p:ph idx="1"/>
           </p:nvPr>
         </p:nvSpPr>
-        <p:spPr/>
-        <p:txBody>
-          <a:bodyPr/>
+        <p:spPr>
+          <a:xfrm>
+            <a:off x="1182445" y="1662109"/>
+            <a:ext cx="9542929" cy="2237591"/>
+          </a:xfrm>
+        </p:spPr>
+        <p:txBody>
+          <a:bodyPr>
+            <a:normAutofit fontScale="92500" lnSpcReduction="10000"/>
+          </a:bodyPr>
           <a:lstStyle/>
+          <a:p>
+            <a:pPr algn="just"/>
+            <a:r>
+              <a:rPr lang="hu-HU" dirty="0" smtClean="0">
+                <a:latin typeface="Bahnschrift SemiBold SemiConden" panose="020B0502040204020203" pitchFamily="34" charset="0"/>
+              </a:rPr>
+              <a:t>A </a:t>
+            </a:r>
+            <a:r>
+              <a:rPr lang="hu-HU" dirty="0" err="1" smtClean="0">
+                <a:latin typeface="Bahnschrift SemiBold SemiConden" panose="020B0502040204020203" pitchFamily="34" charset="0"/>
+              </a:rPr>
+              <a:t>GitHub</a:t>
+            </a:r>
+            <a:r>
+              <a:rPr lang="hu-HU" dirty="0" smtClean="0">
+                <a:latin typeface="Bahnschrift SemiBold SemiConden" panose="020B0502040204020203" pitchFamily="34" charset="0"/>
+              </a:rPr>
+              <a:t> egy online verziókezelő</a:t>
+            </a:r>
+          </a:p>
+          <a:p>
+            <a:pPr algn="just"/>
+            <a:r>
+              <a:rPr lang="hu-HU" dirty="0" smtClean="0">
+                <a:latin typeface="Bahnschrift SemiBold SemiConden" panose="020B0502040204020203" pitchFamily="34" charset="0"/>
+              </a:rPr>
+              <a:t>2018 óta a Microsoft tulajdona</a:t>
+            </a:r>
+          </a:p>
+          <a:p>
+            <a:pPr algn="just"/>
+            <a:r>
+              <a:rPr lang="hu-HU" dirty="0" smtClean="0">
+                <a:latin typeface="Bahnschrift SemiBold SemiConden" panose="020B0502040204020203" pitchFamily="34" charset="0"/>
+              </a:rPr>
+              <a:t>Hatalmas közösség, rengeteg felhasználó</a:t>
+            </a:r>
+          </a:p>
+          <a:p>
+            <a:pPr algn="just"/>
+            <a:r>
+              <a:rPr lang="hu-HU" dirty="0" smtClean="0">
+                <a:latin typeface="Bahnschrift SemiBold SemiConden" panose="020B0502040204020203" pitchFamily="34" charset="0"/>
+              </a:rPr>
+              <a:t>Sok funkciót tud ellátni (ezek segítik a közös munkát)</a:t>
+            </a:r>
+          </a:p>
+          <a:p>
+            <a:pPr algn="just"/>
+            <a:r>
+              <a:rPr lang="hu-HU" dirty="0" smtClean="0">
+                <a:latin typeface="Bahnschrift SemiBold SemiConden" panose="020B0502040204020203" pitchFamily="34" charset="0"/>
+              </a:rPr>
+              <a:t>Könnyen együtt működik más programokkal (pl. Visual </a:t>
+            </a:r>
+            <a:r>
+              <a:rPr lang="hu-HU" dirty="0" err="1" smtClean="0">
+                <a:latin typeface="Bahnschrift SemiBold SemiConden" panose="020B0502040204020203" pitchFamily="34" charset="0"/>
+              </a:rPr>
+              <a:t>Studio</a:t>
+            </a:r>
+            <a:r>
+              <a:rPr lang="hu-HU" dirty="0" smtClean="0">
+                <a:latin typeface="Bahnschrift SemiBold SemiConden" panose="020B0502040204020203" pitchFamily="34" charset="0"/>
+              </a:rPr>
+              <a:t> </a:t>
+            </a:r>
+            <a:r>
+              <a:rPr lang="hu-HU" dirty="0" err="1" smtClean="0">
+                <a:latin typeface="Bahnschrift SemiBold SemiConden" panose="020B0502040204020203" pitchFamily="34" charset="0"/>
+              </a:rPr>
+              <a:t>code</a:t>
+            </a:r>
+            <a:r>
+              <a:rPr lang="hu-HU" dirty="0" smtClean="0">
+                <a:latin typeface="Bahnschrift SemiBold SemiConden" panose="020B0502040204020203" pitchFamily="34" charset="0"/>
+              </a:rPr>
+              <a:t>)</a:t>
+            </a:r>
+          </a:p>
           <a:p>
             <a:endParaRPr lang="hu-HU" dirty="0"/>
           </a:p>
@@ -5228,9 +6051,374 @@
   <p:timing>
     <p:tnLst>
       <p:par>
-        <p:cTn id="1" dur="indefinite" restart="never" nodeType="tmRoot"/>
+        <p:cTn id="1" dur="indefinite" restart="never" nodeType="tmRoot">
+          <p:childTnLst>
+            <p:seq concurrent="1" nextAc="seek">
+              <p:cTn id="2" dur="indefinite" nodeType="mainSeq">
+                <p:childTnLst>
+                  <p:par>
+                    <p:cTn id="3" fill="hold">
+                      <p:stCondLst>
+                        <p:cond delay="indefinite"/>
+                      </p:stCondLst>
+                      <p:childTnLst>
+                        <p:par>
+                          <p:cTn id="4" fill="hold">
+                            <p:stCondLst>
+                              <p:cond delay="0"/>
+                            </p:stCondLst>
+                            <p:childTnLst>
+                              <p:par>
+                                <p:cTn id="5" presetID="10" presetClass="entr" presetSubtype="0" fill="hold" grpId="0" nodeType="clickEffect">
+                                  <p:stCondLst>
+                                    <p:cond delay="0"/>
+                                  </p:stCondLst>
+                                  <p:childTnLst>
+                                    <p:set>
+                                      <p:cBhvr>
+                                        <p:cTn id="6" dur="1" fill="hold">
+                                          <p:stCondLst>
+                                            <p:cond delay="0"/>
+                                          </p:stCondLst>
+                                        </p:cTn>
+                                        <p:tgtEl>
+                                          <p:spTgt spid="2"/>
+                                        </p:tgtEl>
+                                        <p:attrNameLst>
+                                          <p:attrName>style.visibility</p:attrName>
+                                        </p:attrNameLst>
+                                      </p:cBhvr>
+                                      <p:to>
+                                        <p:strVal val="visible"/>
+                                      </p:to>
+                                    </p:set>
+                                    <p:animEffect transition="in" filter="fade">
+                                      <p:cBhvr>
+                                        <p:cTn id="7" dur="500"/>
+                                        <p:tgtEl>
+                                          <p:spTgt spid="2"/>
+                                        </p:tgtEl>
+                                      </p:cBhvr>
+                                    </p:animEffect>
+                                  </p:childTnLst>
+                                </p:cTn>
+                              </p:par>
+                            </p:childTnLst>
+                          </p:cTn>
+                        </p:par>
+                      </p:childTnLst>
+                    </p:cTn>
+                  </p:par>
+                  <p:par>
+                    <p:cTn id="8" fill="hold">
+                      <p:stCondLst>
+                        <p:cond delay="indefinite"/>
+                      </p:stCondLst>
+                      <p:childTnLst>
+                        <p:par>
+                          <p:cTn id="9" fill="hold">
+                            <p:stCondLst>
+                              <p:cond delay="0"/>
+                            </p:stCondLst>
+                            <p:childTnLst>
+                              <p:par>
+                                <p:cTn id="10" presetID="10" presetClass="entr" presetSubtype="0" fill="hold" nodeType="clickEffect">
+                                  <p:stCondLst>
+                                    <p:cond delay="0"/>
+                                  </p:stCondLst>
+                                  <p:childTnLst>
+                                    <p:set>
+                                      <p:cBhvr>
+                                        <p:cTn id="11" dur="1" fill="hold">
+                                          <p:stCondLst>
+                                            <p:cond delay="0"/>
+                                          </p:stCondLst>
+                                        </p:cTn>
+                                        <p:tgtEl>
+                                          <p:spTgt spid="3">
+                                            <p:txEl>
+                                              <p:pRg st="0" end="0"/>
+                                            </p:txEl>
+                                          </p:spTgt>
+                                        </p:tgtEl>
+                                        <p:attrNameLst>
+                                          <p:attrName>style.visibility</p:attrName>
+                                        </p:attrNameLst>
+                                      </p:cBhvr>
+                                      <p:to>
+                                        <p:strVal val="visible"/>
+                                      </p:to>
+                                    </p:set>
+                                    <p:animEffect transition="in" filter="fade">
+                                      <p:cBhvr>
+                                        <p:cTn id="12" dur="500"/>
+                                        <p:tgtEl>
+                                          <p:spTgt spid="3">
+                                            <p:txEl>
+                                              <p:pRg st="0" end="0"/>
+                                            </p:txEl>
+                                          </p:spTgt>
+                                        </p:tgtEl>
+                                      </p:cBhvr>
+                                    </p:animEffect>
+                                  </p:childTnLst>
+                                </p:cTn>
+                              </p:par>
+                              <p:par>
+                                <p:cTn id="13" presetID="10" presetClass="entr" presetSubtype="0" fill="hold" nodeType="withEffect">
+                                  <p:stCondLst>
+                                    <p:cond delay="0"/>
+                                  </p:stCondLst>
+                                  <p:childTnLst>
+                                    <p:set>
+                                      <p:cBhvr>
+                                        <p:cTn id="14" dur="1" fill="hold">
+                                          <p:stCondLst>
+                                            <p:cond delay="0"/>
+                                          </p:stCondLst>
+                                        </p:cTn>
+                                        <p:tgtEl>
+                                          <p:spTgt spid="3">
+                                            <p:txEl>
+                                              <p:pRg st="1" end="1"/>
+                                            </p:txEl>
+                                          </p:spTgt>
+                                        </p:tgtEl>
+                                        <p:attrNameLst>
+                                          <p:attrName>style.visibility</p:attrName>
+                                        </p:attrNameLst>
+                                      </p:cBhvr>
+                                      <p:to>
+                                        <p:strVal val="visible"/>
+                                      </p:to>
+                                    </p:set>
+                                    <p:animEffect transition="in" filter="fade">
+                                      <p:cBhvr>
+                                        <p:cTn id="15" dur="500"/>
+                                        <p:tgtEl>
+                                          <p:spTgt spid="3">
+                                            <p:txEl>
+                                              <p:pRg st="1" end="1"/>
+                                            </p:txEl>
+                                          </p:spTgt>
+                                        </p:tgtEl>
+                                      </p:cBhvr>
+                                    </p:animEffect>
+                                  </p:childTnLst>
+                                </p:cTn>
+                              </p:par>
+                              <p:par>
+                                <p:cTn id="16" presetID="10" presetClass="entr" presetSubtype="0" fill="hold" nodeType="withEffect">
+                                  <p:stCondLst>
+                                    <p:cond delay="0"/>
+                                  </p:stCondLst>
+                                  <p:childTnLst>
+                                    <p:set>
+                                      <p:cBhvr>
+                                        <p:cTn id="17" dur="1" fill="hold">
+                                          <p:stCondLst>
+                                            <p:cond delay="0"/>
+                                          </p:stCondLst>
+                                        </p:cTn>
+                                        <p:tgtEl>
+                                          <p:spTgt spid="3">
+                                            <p:txEl>
+                                              <p:pRg st="2" end="2"/>
+                                            </p:txEl>
+                                          </p:spTgt>
+                                        </p:tgtEl>
+                                        <p:attrNameLst>
+                                          <p:attrName>style.visibility</p:attrName>
+                                        </p:attrNameLst>
+                                      </p:cBhvr>
+                                      <p:to>
+                                        <p:strVal val="visible"/>
+                                      </p:to>
+                                    </p:set>
+                                    <p:animEffect transition="in" filter="fade">
+                                      <p:cBhvr>
+                                        <p:cTn id="18" dur="500"/>
+                                        <p:tgtEl>
+                                          <p:spTgt spid="3">
+                                            <p:txEl>
+                                              <p:pRg st="2" end="2"/>
+                                            </p:txEl>
+                                          </p:spTgt>
+                                        </p:tgtEl>
+                                      </p:cBhvr>
+                                    </p:animEffect>
+                                  </p:childTnLst>
+                                </p:cTn>
+                              </p:par>
+                              <p:par>
+                                <p:cTn id="19" presetID="10" presetClass="entr" presetSubtype="0" fill="hold" nodeType="withEffect">
+                                  <p:stCondLst>
+                                    <p:cond delay="0"/>
+                                  </p:stCondLst>
+                                  <p:childTnLst>
+                                    <p:set>
+                                      <p:cBhvr>
+                                        <p:cTn id="20" dur="1" fill="hold">
+                                          <p:stCondLst>
+                                            <p:cond delay="0"/>
+                                          </p:stCondLst>
+                                        </p:cTn>
+                                        <p:tgtEl>
+                                          <p:spTgt spid="3">
+                                            <p:txEl>
+                                              <p:pRg st="3" end="3"/>
+                                            </p:txEl>
+                                          </p:spTgt>
+                                        </p:tgtEl>
+                                        <p:attrNameLst>
+                                          <p:attrName>style.visibility</p:attrName>
+                                        </p:attrNameLst>
+                                      </p:cBhvr>
+                                      <p:to>
+                                        <p:strVal val="visible"/>
+                                      </p:to>
+                                    </p:set>
+                                    <p:animEffect transition="in" filter="fade">
+                                      <p:cBhvr>
+                                        <p:cTn id="21" dur="500"/>
+                                        <p:tgtEl>
+                                          <p:spTgt spid="3">
+                                            <p:txEl>
+                                              <p:pRg st="3" end="3"/>
+                                            </p:txEl>
+                                          </p:spTgt>
+                                        </p:tgtEl>
+                                      </p:cBhvr>
+                                    </p:animEffect>
+                                  </p:childTnLst>
+                                </p:cTn>
+                              </p:par>
+                              <p:par>
+                                <p:cTn id="22" presetID="10" presetClass="entr" presetSubtype="0" fill="hold" nodeType="withEffect">
+                                  <p:stCondLst>
+                                    <p:cond delay="0"/>
+                                  </p:stCondLst>
+                                  <p:childTnLst>
+                                    <p:set>
+                                      <p:cBhvr>
+                                        <p:cTn id="23" dur="1" fill="hold">
+                                          <p:stCondLst>
+                                            <p:cond delay="0"/>
+                                          </p:stCondLst>
+                                        </p:cTn>
+                                        <p:tgtEl>
+                                          <p:spTgt spid="3">
+                                            <p:txEl>
+                                              <p:pRg st="4" end="4"/>
+                                            </p:txEl>
+                                          </p:spTgt>
+                                        </p:tgtEl>
+                                        <p:attrNameLst>
+                                          <p:attrName>style.visibility</p:attrName>
+                                        </p:attrNameLst>
+                                      </p:cBhvr>
+                                      <p:to>
+                                        <p:strVal val="visible"/>
+                                      </p:to>
+                                    </p:set>
+                                    <p:animEffect transition="in" filter="fade">
+                                      <p:cBhvr>
+                                        <p:cTn id="24" dur="500"/>
+                                        <p:tgtEl>
+                                          <p:spTgt spid="3">
+                                            <p:txEl>
+                                              <p:pRg st="4" end="4"/>
+                                            </p:txEl>
+                                          </p:spTgt>
+                                        </p:tgtEl>
+                                      </p:cBhvr>
+                                    </p:animEffect>
+                                  </p:childTnLst>
+                                </p:cTn>
+                              </p:par>
+                            </p:childTnLst>
+                          </p:cTn>
+                        </p:par>
+                      </p:childTnLst>
+                    </p:cTn>
+                  </p:par>
+                  <p:par>
+                    <p:cTn id="25" fill="hold">
+                      <p:stCondLst>
+                        <p:cond delay="indefinite"/>
+                      </p:stCondLst>
+                      <p:childTnLst>
+                        <p:par>
+                          <p:cTn id="26" fill="hold">
+                            <p:stCondLst>
+                              <p:cond delay="0"/>
+                            </p:stCondLst>
+                            <p:childTnLst>
+                              <p:par>
+                                <p:cTn id="27" presetID="10" presetClass="entr" presetSubtype="0" fill="hold" nodeType="clickEffect">
+                                  <p:stCondLst>
+                                    <p:cond delay="0"/>
+                                  </p:stCondLst>
+                                  <p:childTnLst>
+                                    <p:set>
+                                      <p:cBhvr>
+                                        <p:cTn id="28" dur="1" fill="hold">
+                                          <p:stCondLst>
+                                            <p:cond delay="0"/>
+                                          </p:stCondLst>
+                                        </p:cTn>
+                                        <p:tgtEl>
+                                          <p:spTgt spid="4"/>
+                                        </p:tgtEl>
+                                        <p:attrNameLst>
+                                          <p:attrName>style.visibility</p:attrName>
+                                        </p:attrNameLst>
+                                      </p:cBhvr>
+                                      <p:to>
+                                        <p:strVal val="visible"/>
+                                      </p:to>
+                                    </p:set>
+                                    <p:animEffect transition="in" filter="fade">
+                                      <p:cBhvr>
+                                        <p:cTn id="29" dur="500"/>
+                                        <p:tgtEl>
+                                          <p:spTgt spid="4"/>
+                                        </p:tgtEl>
+                                      </p:cBhvr>
+                                    </p:animEffect>
+                                  </p:childTnLst>
+                                </p:cTn>
+                              </p:par>
+                            </p:childTnLst>
+                          </p:cTn>
+                        </p:par>
+                      </p:childTnLst>
+                    </p:cTn>
+                  </p:par>
+                </p:childTnLst>
+              </p:cTn>
+              <p:prevCondLst>
+                <p:cond evt="onPrev" delay="0">
+                  <p:tgtEl>
+                    <p:sldTgt/>
+                  </p:tgtEl>
+                </p:cond>
+              </p:prevCondLst>
+              <p:nextCondLst>
+                <p:cond evt="onNext" delay="0">
+                  <p:tgtEl>
+                    <p:sldTgt/>
+                  </p:tgtEl>
+                </p:cond>
+              </p:nextCondLst>
+            </p:seq>
+          </p:childTnLst>
+        </p:cTn>
       </p:par>
     </p:tnLst>
+    <p:bldLst>
+      <p:bldP spid="2" grpId="0"/>
+    </p:bldLst>
   </p:timing>
 </p:sld>
 </file>
@@ -5262,35 +6450,152 @@
             <p:ph type="ctrTitle"/>
           </p:nvPr>
         </p:nvSpPr>
-        <p:spPr/>
+        <p:spPr>
+          <a:xfrm>
+            <a:off x="1524000" y="982513"/>
+            <a:ext cx="9144000" cy="2387600"/>
+          </a:xfrm>
+        </p:spPr>
         <p:txBody>
           <a:bodyPr/>
           <a:lstStyle/>
           <a:p>
             <a:r>
-              <a:rPr lang="hu-HU" dirty="0" smtClean="0"/>
-              <a:t>Köszönöm a figyelmet!</a:t>
-            </a:r>
+              <a:rPr lang="hu-HU" dirty="0" smtClean="0">
+                <a:latin typeface="Bahnschrift SemiBold" panose="020B0502040204020203" pitchFamily="34" charset="0"/>
+              </a:rPr>
+              <a:t>Köszönöm a figyelmet</a:t>
+            </a:r>
+            <a:r>
+              <a:rPr lang="hu-HU" dirty="0" smtClean="0">
+                <a:latin typeface="Bahnschrift SemiBold" panose="020B0502040204020203" pitchFamily="34" charset="0"/>
+              </a:rPr>
+              <a:t>! &lt;3</a:t>
+            </a:r>
+            <a:endParaRPr lang="hu-HU" dirty="0">
+              <a:latin typeface="Bahnschrift SemiBold" panose="020B0502040204020203" pitchFamily="34" charset="0"/>
+            </a:endParaRPr>
+          </a:p>
+        </p:txBody>
+      </p:sp>
+      <p:sp>
+        <p:nvSpPr>
+          <p:cNvPr id="5" name="Alcím 4"/>
+          <p:cNvSpPr>
+            <a:spLocks noGrp="1"/>
+          </p:cNvSpPr>
+          <p:nvPr>
+            <p:ph type="subTitle" idx="1"/>
+          </p:nvPr>
+        </p:nvSpPr>
+        <p:spPr>
+          <a:xfrm>
+            <a:off x="1376979" y="4290528"/>
+            <a:ext cx="9438042" cy="1873604"/>
+          </a:xfrm>
+        </p:spPr>
+        <p:txBody>
+          <a:bodyPr>
+            <a:normAutofit fontScale="92500" lnSpcReduction="20000"/>
+          </a:bodyPr>
+          <a:lstStyle/>
+          <a:p>
+            <a:r>
+              <a:rPr lang="hu-HU" dirty="0" smtClean="0">
+                <a:latin typeface="Bahnschrift SemiBold SemiConden" panose="020B0502040204020203" pitchFamily="34" charset="0"/>
+              </a:rPr>
+              <a:t>Források</a:t>
+            </a:r>
+            <a:r>
+              <a:rPr lang="hu-HU" dirty="0">
+                <a:latin typeface="Bahnschrift SemiBold SemiConden" panose="020B0502040204020203" pitchFamily="34" charset="0"/>
+              </a:rPr>
+              <a:t>: </a:t>
+            </a:r>
+            <a:endParaRPr lang="hu-HU" dirty="0" smtClean="0">
+              <a:latin typeface="Bahnschrift SemiBold SemiConden" panose="020B0502040204020203" pitchFamily="34" charset="0"/>
+            </a:endParaRPr>
+          </a:p>
+          <a:p>
+            <a:r>
+              <a:rPr lang="hu-HU" dirty="0" smtClean="0">
+                <a:latin typeface="Bahnschrift SemiBold SemiConden" panose="020B0502040204020203" pitchFamily="34" charset="0"/>
+                <a:hlinkClick r:id="rId2"/>
+              </a:rPr>
+              <a:t>https</a:t>
+            </a:r>
+            <a:r>
+              <a:rPr lang="hu-HU" dirty="0">
+                <a:latin typeface="Bahnschrift SemiBold SemiConden" panose="020B0502040204020203" pitchFamily="34" charset="0"/>
+                <a:hlinkClick r:id="rId2"/>
+              </a:rPr>
+              <a:t>://</a:t>
+            </a:r>
+            <a:r>
+              <a:rPr lang="hu-HU" dirty="0" smtClean="0">
+                <a:latin typeface="Bahnschrift SemiBold SemiConden" panose="020B0502040204020203" pitchFamily="34" charset="0"/>
+                <a:hlinkClick r:id="rId2"/>
+              </a:rPr>
+              <a:t>bit.ly/3f9NT3L</a:t>
+            </a:r>
+            <a:endParaRPr lang="hu-HU" dirty="0" smtClean="0">
+              <a:latin typeface="Bahnschrift SemiBold SemiConden" panose="020B0502040204020203" pitchFamily="34" charset="0"/>
+            </a:endParaRPr>
+          </a:p>
+          <a:p>
+            <a:r>
+              <a:rPr lang="hu-HU" dirty="0">
+                <a:latin typeface="Bahnschrift SemiBold SemiConden" panose="020B0502040204020203" pitchFamily="34" charset="0"/>
+                <a:hlinkClick r:id="rId3"/>
+              </a:rPr>
+              <a:t>https://</a:t>
+            </a:r>
+            <a:r>
+              <a:rPr lang="hu-HU" dirty="0" smtClean="0">
+                <a:latin typeface="Bahnschrift SemiBold SemiConden" panose="020B0502040204020203" pitchFamily="34" charset="0"/>
+                <a:hlinkClick r:id="rId3"/>
+              </a:rPr>
+              <a:t>bit.ly/3S6YieY</a:t>
+            </a:r>
+            <a:endParaRPr lang="hu-HU" dirty="0" smtClean="0">
+              <a:latin typeface="Bahnschrift SemiBold SemiConden" panose="020B0502040204020203" pitchFamily="34" charset="0"/>
+            </a:endParaRPr>
+          </a:p>
+          <a:p>
+            <a:r>
+              <a:rPr lang="hu-HU" dirty="0">
+                <a:latin typeface="Bahnschrift SemiBold SemiConden" panose="020B0502040204020203" pitchFamily="34" charset="0"/>
+                <a:hlinkClick r:id="rId4"/>
+              </a:rPr>
+              <a:t>https://</a:t>
+            </a:r>
+            <a:r>
+              <a:rPr lang="hu-HU" dirty="0" smtClean="0">
+                <a:latin typeface="Bahnschrift SemiBold SemiConden" panose="020B0502040204020203" pitchFamily="34" charset="0"/>
+                <a:hlinkClick r:id="rId4"/>
+              </a:rPr>
+              <a:t>bit.ly/3DGti1a</a:t>
+            </a:r>
+            <a:endParaRPr lang="hu-HU" dirty="0" smtClean="0">
+              <a:latin typeface="Bahnschrift SemiBold SemiConden" panose="020B0502040204020203" pitchFamily="34" charset="0"/>
+            </a:endParaRPr>
+          </a:p>
+          <a:p>
+            <a:r>
+              <a:rPr lang="hu-HU" dirty="0" smtClean="0">
+                <a:latin typeface="Bahnschrift SemiBold SemiConden" panose="020B0502040204020203" pitchFamily="34" charset="0"/>
+              </a:rPr>
+              <a:t>+ az IKT órákon szerzett ismeretek.</a:t>
+            </a:r>
+            <a:endParaRPr lang="hu-HU" dirty="0">
+              <a:latin typeface="Bahnschrift SemiBold SemiConden" panose="020B0502040204020203" pitchFamily="34" charset="0"/>
+            </a:endParaRPr>
+          </a:p>
+          <a:p>
+            <a:endParaRPr lang="hu-HU" dirty="0" smtClean="0"/>
+          </a:p>
+          <a:p>
             <a:endParaRPr lang="hu-HU" dirty="0"/>
-          </a:p>
-        </p:txBody>
-      </p:sp>
-      <p:sp>
-        <p:nvSpPr>
-          <p:cNvPr id="5" name="Alcím 4"/>
-          <p:cNvSpPr>
-            <a:spLocks noGrp="1"/>
-          </p:cNvSpPr>
-          <p:nvPr>
-            <p:ph type="subTitle" idx="1"/>
-          </p:nvPr>
-        </p:nvSpPr>
-        <p:spPr/>
-        <p:txBody>
-          <a:bodyPr/>
-          <a:lstStyle/>
-          <a:p>
-            <a:endParaRPr lang="hu-HU"/>
           </a:p>
         </p:txBody>
       </p:sp>
@@ -5307,9 +6612,321 @@
   <p:timing>
     <p:tnLst>
       <p:par>
-        <p:cTn id="1" dur="indefinite" restart="never" nodeType="tmRoot"/>
+        <p:cTn id="1" dur="indefinite" restart="never" nodeType="tmRoot">
+          <p:childTnLst>
+            <p:seq concurrent="1" nextAc="seek">
+              <p:cTn id="2" dur="indefinite" nodeType="mainSeq">
+                <p:childTnLst>
+                  <p:par>
+                    <p:cTn id="3" fill="hold">
+                      <p:stCondLst>
+                        <p:cond delay="indefinite"/>
+                      </p:stCondLst>
+                      <p:childTnLst>
+                        <p:par>
+                          <p:cTn id="4" fill="hold">
+                            <p:stCondLst>
+                              <p:cond delay="0"/>
+                            </p:stCondLst>
+                            <p:childTnLst>
+                              <p:par>
+                                <p:cTn id="5" presetID="10" presetClass="entr" presetSubtype="0" fill="hold" grpId="0" nodeType="clickEffect">
+                                  <p:stCondLst>
+                                    <p:cond delay="0"/>
+                                  </p:stCondLst>
+                                  <p:childTnLst>
+                                    <p:set>
+                                      <p:cBhvr>
+                                        <p:cTn id="6" dur="1" fill="hold">
+                                          <p:stCondLst>
+                                            <p:cond delay="0"/>
+                                          </p:stCondLst>
+                                        </p:cTn>
+                                        <p:tgtEl>
+                                          <p:spTgt spid="4"/>
+                                        </p:tgtEl>
+                                        <p:attrNameLst>
+                                          <p:attrName>style.visibility</p:attrName>
+                                        </p:attrNameLst>
+                                      </p:cBhvr>
+                                      <p:to>
+                                        <p:strVal val="visible"/>
+                                      </p:to>
+                                    </p:set>
+                                    <p:animEffect transition="in" filter="fade">
+                                      <p:cBhvr>
+                                        <p:cTn id="7" dur="500"/>
+                                        <p:tgtEl>
+                                          <p:spTgt spid="4"/>
+                                        </p:tgtEl>
+                                      </p:cBhvr>
+                                    </p:animEffect>
+                                  </p:childTnLst>
+                                </p:cTn>
+                              </p:par>
+                            </p:childTnLst>
+                          </p:cTn>
+                        </p:par>
+                      </p:childTnLst>
+                    </p:cTn>
+                  </p:par>
+                  <p:par>
+                    <p:cTn id="8" fill="hold">
+                      <p:stCondLst>
+                        <p:cond delay="indefinite"/>
+                      </p:stCondLst>
+                      <p:childTnLst>
+                        <p:par>
+                          <p:cTn id="9" fill="hold">
+                            <p:stCondLst>
+                              <p:cond delay="0"/>
+                            </p:stCondLst>
+                            <p:childTnLst>
+                              <p:par>
+                                <p:cTn id="10" presetID="10" presetClass="entr" presetSubtype="0" fill="hold" nodeType="clickEffect">
+                                  <p:stCondLst>
+                                    <p:cond delay="0"/>
+                                  </p:stCondLst>
+                                  <p:childTnLst>
+                                    <p:set>
+                                      <p:cBhvr>
+                                        <p:cTn id="11" dur="1" fill="hold">
+                                          <p:stCondLst>
+                                            <p:cond delay="0"/>
+                                          </p:stCondLst>
+                                        </p:cTn>
+                                        <p:tgtEl>
+                                          <p:spTgt spid="5">
+                                            <p:txEl>
+                                              <p:pRg st="0" end="0"/>
+                                            </p:txEl>
+                                          </p:spTgt>
+                                        </p:tgtEl>
+                                        <p:attrNameLst>
+                                          <p:attrName>style.visibility</p:attrName>
+                                        </p:attrNameLst>
+                                      </p:cBhvr>
+                                      <p:to>
+                                        <p:strVal val="visible"/>
+                                      </p:to>
+                                    </p:set>
+                                    <p:animEffect transition="in" filter="fade">
+                                      <p:cBhvr>
+                                        <p:cTn id="12" dur="500"/>
+                                        <p:tgtEl>
+                                          <p:spTgt spid="5">
+                                            <p:txEl>
+                                              <p:pRg st="0" end="0"/>
+                                            </p:txEl>
+                                          </p:spTgt>
+                                        </p:tgtEl>
+                                      </p:cBhvr>
+                                    </p:animEffect>
+                                  </p:childTnLst>
+                                </p:cTn>
+                              </p:par>
+                              <p:par>
+                                <p:cTn id="13" presetID="10" presetClass="entr" presetSubtype="0" fill="hold" nodeType="withEffect">
+                                  <p:stCondLst>
+                                    <p:cond delay="0"/>
+                                  </p:stCondLst>
+                                  <p:childTnLst>
+                                    <p:set>
+                                      <p:cBhvr>
+                                        <p:cTn id="14" dur="1" fill="hold">
+                                          <p:stCondLst>
+                                            <p:cond delay="0"/>
+                                          </p:stCondLst>
+                                        </p:cTn>
+                                        <p:tgtEl>
+                                          <p:spTgt spid="5">
+                                            <p:txEl>
+                                              <p:pRg st="1" end="1"/>
+                                            </p:txEl>
+                                          </p:spTgt>
+                                        </p:tgtEl>
+                                        <p:attrNameLst>
+                                          <p:attrName>style.visibility</p:attrName>
+                                        </p:attrNameLst>
+                                      </p:cBhvr>
+                                      <p:to>
+                                        <p:strVal val="visible"/>
+                                      </p:to>
+                                    </p:set>
+                                    <p:animEffect transition="in" filter="fade">
+                                      <p:cBhvr>
+                                        <p:cTn id="15" dur="500"/>
+                                        <p:tgtEl>
+                                          <p:spTgt spid="5">
+                                            <p:txEl>
+                                              <p:pRg st="1" end="1"/>
+                                            </p:txEl>
+                                          </p:spTgt>
+                                        </p:tgtEl>
+                                      </p:cBhvr>
+                                    </p:animEffect>
+                                  </p:childTnLst>
+                                </p:cTn>
+                              </p:par>
+                              <p:par>
+                                <p:cTn id="16" presetID="10" presetClass="entr" presetSubtype="0" fill="hold" nodeType="withEffect">
+                                  <p:stCondLst>
+                                    <p:cond delay="0"/>
+                                  </p:stCondLst>
+                                  <p:childTnLst>
+                                    <p:set>
+                                      <p:cBhvr>
+                                        <p:cTn id="17" dur="1" fill="hold">
+                                          <p:stCondLst>
+                                            <p:cond delay="0"/>
+                                          </p:stCondLst>
+                                        </p:cTn>
+                                        <p:tgtEl>
+                                          <p:spTgt spid="5">
+                                            <p:txEl>
+                                              <p:pRg st="2" end="2"/>
+                                            </p:txEl>
+                                          </p:spTgt>
+                                        </p:tgtEl>
+                                        <p:attrNameLst>
+                                          <p:attrName>style.visibility</p:attrName>
+                                        </p:attrNameLst>
+                                      </p:cBhvr>
+                                      <p:to>
+                                        <p:strVal val="visible"/>
+                                      </p:to>
+                                    </p:set>
+                                    <p:animEffect transition="in" filter="fade">
+                                      <p:cBhvr>
+                                        <p:cTn id="18" dur="500"/>
+                                        <p:tgtEl>
+                                          <p:spTgt spid="5">
+                                            <p:txEl>
+                                              <p:pRg st="2" end="2"/>
+                                            </p:txEl>
+                                          </p:spTgt>
+                                        </p:tgtEl>
+                                      </p:cBhvr>
+                                    </p:animEffect>
+                                  </p:childTnLst>
+                                </p:cTn>
+                              </p:par>
+                              <p:par>
+                                <p:cTn id="19" presetID="10" presetClass="entr" presetSubtype="0" fill="hold" nodeType="withEffect">
+                                  <p:stCondLst>
+                                    <p:cond delay="0"/>
+                                  </p:stCondLst>
+                                  <p:childTnLst>
+                                    <p:set>
+                                      <p:cBhvr>
+                                        <p:cTn id="20" dur="1" fill="hold">
+                                          <p:stCondLst>
+                                            <p:cond delay="0"/>
+                                          </p:stCondLst>
+                                        </p:cTn>
+                                        <p:tgtEl>
+                                          <p:spTgt spid="5">
+                                            <p:txEl>
+                                              <p:pRg st="3" end="3"/>
+                                            </p:txEl>
+                                          </p:spTgt>
+                                        </p:tgtEl>
+                                        <p:attrNameLst>
+                                          <p:attrName>style.visibility</p:attrName>
+                                        </p:attrNameLst>
+                                      </p:cBhvr>
+                                      <p:to>
+                                        <p:strVal val="visible"/>
+                                      </p:to>
+                                    </p:set>
+                                    <p:animEffect transition="in" filter="fade">
+                                      <p:cBhvr>
+                                        <p:cTn id="21" dur="500"/>
+                                        <p:tgtEl>
+                                          <p:spTgt spid="5">
+                                            <p:txEl>
+                                              <p:pRg st="3" end="3"/>
+                                            </p:txEl>
+                                          </p:spTgt>
+                                        </p:tgtEl>
+                                      </p:cBhvr>
+                                    </p:animEffect>
+                                  </p:childTnLst>
+                                </p:cTn>
+                              </p:par>
+                              <p:par>
+                                <p:cTn id="22" presetID="10" presetClass="entr" presetSubtype="0" fill="hold" nodeType="withEffect">
+                                  <p:stCondLst>
+                                    <p:cond delay="0"/>
+                                  </p:stCondLst>
+                                  <p:childTnLst>
+                                    <p:set>
+                                      <p:cBhvr>
+                                        <p:cTn id="23" dur="1" fill="hold">
+                                          <p:stCondLst>
+                                            <p:cond delay="0"/>
+                                          </p:stCondLst>
+                                        </p:cTn>
+                                        <p:tgtEl>
+                                          <p:spTgt spid="5">
+                                            <p:txEl>
+                                              <p:pRg st="4" end="4"/>
+                                            </p:txEl>
+                                          </p:spTgt>
+                                        </p:tgtEl>
+                                        <p:attrNameLst>
+                                          <p:attrName>style.visibility</p:attrName>
+                                        </p:attrNameLst>
+                                      </p:cBhvr>
+                                      <p:to>
+                                        <p:strVal val="visible"/>
+                                      </p:to>
+                                    </p:set>
+                                    <p:animEffect transition="in" filter="fade">
+                                      <p:cBhvr>
+                                        <p:cTn id="24" dur="500"/>
+                                        <p:tgtEl>
+                                          <p:spTgt spid="5">
+                                            <p:txEl>
+                                              <p:pRg st="4" end="4"/>
+                                            </p:txEl>
+                                          </p:spTgt>
+                                        </p:tgtEl>
+                                      </p:cBhvr>
+                                    </p:animEffect>
+                                  </p:childTnLst>
+                                </p:cTn>
+                              </p:par>
+                            </p:childTnLst>
+                          </p:cTn>
+                        </p:par>
+                      </p:childTnLst>
+                    </p:cTn>
+                  </p:par>
+                </p:childTnLst>
+              </p:cTn>
+              <p:prevCondLst>
+                <p:cond evt="onPrev" delay="0">
+                  <p:tgtEl>
+                    <p:sldTgt/>
+                  </p:tgtEl>
+                </p:cond>
+              </p:prevCondLst>
+              <p:nextCondLst>
+                <p:cond evt="onNext" delay="0">
+                  <p:tgtEl>
+                    <p:sldTgt/>
+                  </p:tgtEl>
+                </p:cond>
+              </p:nextCondLst>
+            </p:seq>
+          </p:childTnLst>
+        </p:cTn>
       </p:par>
     </p:tnLst>
+    <p:bldLst>
+      <p:bldP spid="4" grpId="0"/>
+    </p:bldLst>
   </p:timing>
 </p:sld>
 </file>

</xml_diff>